<commit_message>
Adding changes to MG
</commit_message>
<xml_diff>
--- a/docs/Design/MG/UsesHierarchy.pptx
+++ b/docs/Design/MG/UsesHierarchy.pptx
@@ -5,7 +5,7 @@
     <p:sldMasterId id="2147483648" r:id="rId1"/>
   </p:sldMasterIdLst>
   <p:sldIdLst>
-    <p:sldId id="256" r:id="rId2"/>
+    <p:sldId id="258" r:id="rId2"/>
   </p:sldIdLst>
   <p:sldSz cx="12192000" cy="6858000"/>
   <p:notesSz cx="6858000" cy="9144000"/>
@@ -259,7 +259,7 @@
           <a:p>
             <a:fld id="{01E2A76B-7CC1-6A45-8BDA-5577ADFF03EE}" type="datetimeFigureOut">
               <a:rPr lang="en-US" smtClean="0"/>
-              <a:t>10/30/18</a:t>
+              <a:t>11/4/18</a:t>
             </a:fld>
             <a:endParaRPr lang="en-US"/>
           </a:p>
@@ -457,7 +457,7 @@
           <a:p>
             <a:fld id="{01E2A76B-7CC1-6A45-8BDA-5577ADFF03EE}" type="datetimeFigureOut">
               <a:rPr lang="en-US" smtClean="0"/>
-              <a:t>10/30/18</a:t>
+              <a:t>11/4/18</a:t>
             </a:fld>
             <a:endParaRPr lang="en-US"/>
           </a:p>
@@ -665,7 +665,7 @@
           <a:p>
             <a:fld id="{01E2A76B-7CC1-6A45-8BDA-5577ADFF03EE}" type="datetimeFigureOut">
               <a:rPr lang="en-US" smtClean="0"/>
-              <a:t>10/30/18</a:t>
+              <a:t>11/4/18</a:t>
             </a:fld>
             <a:endParaRPr lang="en-US"/>
           </a:p>
@@ -863,7 +863,7 @@
           <a:p>
             <a:fld id="{01E2A76B-7CC1-6A45-8BDA-5577ADFF03EE}" type="datetimeFigureOut">
               <a:rPr lang="en-US" smtClean="0"/>
-              <a:t>10/30/18</a:t>
+              <a:t>11/4/18</a:t>
             </a:fld>
             <a:endParaRPr lang="en-US"/>
           </a:p>
@@ -1138,7 +1138,7 @@
           <a:p>
             <a:fld id="{01E2A76B-7CC1-6A45-8BDA-5577ADFF03EE}" type="datetimeFigureOut">
               <a:rPr lang="en-US" smtClean="0"/>
-              <a:t>10/30/18</a:t>
+              <a:t>11/4/18</a:t>
             </a:fld>
             <a:endParaRPr lang="en-US"/>
           </a:p>
@@ -1403,7 +1403,7 @@
           <a:p>
             <a:fld id="{01E2A76B-7CC1-6A45-8BDA-5577ADFF03EE}" type="datetimeFigureOut">
               <a:rPr lang="en-US" smtClean="0"/>
-              <a:t>10/30/18</a:t>
+              <a:t>11/4/18</a:t>
             </a:fld>
             <a:endParaRPr lang="en-US"/>
           </a:p>
@@ -1815,7 +1815,7 @@
           <a:p>
             <a:fld id="{01E2A76B-7CC1-6A45-8BDA-5577ADFF03EE}" type="datetimeFigureOut">
               <a:rPr lang="en-US" smtClean="0"/>
-              <a:t>10/30/18</a:t>
+              <a:t>11/4/18</a:t>
             </a:fld>
             <a:endParaRPr lang="en-US"/>
           </a:p>
@@ -1956,7 +1956,7 @@
           <a:p>
             <a:fld id="{01E2A76B-7CC1-6A45-8BDA-5577ADFF03EE}" type="datetimeFigureOut">
               <a:rPr lang="en-US" smtClean="0"/>
-              <a:t>10/30/18</a:t>
+              <a:t>11/4/18</a:t>
             </a:fld>
             <a:endParaRPr lang="en-US"/>
           </a:p>
@@ -2069,7 +2069,7 @@
           <a:p>
             <a:fld id="{01E2A76B-7CC1-6A45-8BDA-5577ADFF03EE}" type="datetimeFigureOut">
               <a:rPr lang="en-US" smtClean="0"/>
-              <a:t>10/30/18</a:t>
+              <a:t>11/4/18</a:t>
             </a:fld>
             <a:endParaRPr lang="en-US"/>
           </a:p>
@@ -2380,7 +2380,7 @@
           <a:p>
             <a:fld id="{01E2A76B-7CC1-6A45-8BDA-5577ADFF03EE}" type="datetimeFigureOut">
               <a:rPr lang="en-US" smtClean="0"/>
-              <a:t>10/30/18</a:t>
+              <a:t>11/4/18</a:t>
             </a:fld>
             <a:endParaRPr lang="en-US"/>
           </a:p>
@@ -2668,7 +2668,7 @@
           <a:p>
             <a:fld id="{01E2A76B-7CC1-6A45-8BDA-5577ADFF03EE}" type="datetimeFigureOut">
               <a:rPr lang="en-US" smtClean="0"/>
-              <a:t>10/30/18</a:t>
+              <a:t>11/4/18</a:t>
             </a:fld>
             <a:endParaRPr lang="en-US"/>
           </a:p>
@@ -2909,7 +2909,7 @@
           <a:p>
             <a:fld id="{01E2A76B-7CC1-6A45-8BDA-5577ADFF03EE}" type="datetimeFigureOut">
               <a:rPr lang="en-US" smtClean="0"/>
-              <a:t>10/30/18</a:t>
+              <a:t>11/4/18</a:t>
             </a:fld>
             <a:endParaRPr lang="en-US"/>
           </a:p>
@@ -3340,10 +3340,10 @@
         </p:nvGrpSpPr>
         <p:grpSpPr>
           <a:xfrm>
-            <a:off x="643467" y="405243"/>
-            <a:ext cx="10983228" cy="6020836"/>
-            <a:chOff x="643467" y="405243"/>
-            <a:chExt cx="10983228" cy="6020836"/>
+            <a:off x="1399965" y="418582"/>
+            <a:ext cx="9026568" cy="6316439"/>
+            <a:chOff x="1387439" y="405243"/>
+            <a:chExt cx="9026568" cy="6316439"/>
           </a:xfrm>
         </p:grpSpPr>
         <p:sp>
@@ -3360,7 +3360,7 @@
           </p:nvSpPr>
           <p:spPr>
             <a:xfrm>
-              <a:off x="9211370" y="2088625"/>
+              <a:off x="9116967" y="4099371"/>
               <a:ext cx="1202629" cy="764087"/>
             </a:xfrm>
             <a:prstGeom prst="rect">
@@ -3432,8 +3432,8 @@
             </p:nvSpPr>
             <p:spPr>
               <a:xfrm>
-                <a:off x="5334002" y="609600"/>
-                <a:ext cx="1661609" cy="369332"/>
+                <a:off x="5534418" y="609600"/>
+                <a:ext cx="1469826" cy="646331"/>
               </a:xfrm>
               <a:prstGeom prst="rect">
                 <a:avLst/>
@@ -3446,9 +3446,17 @@
               </a:bodyPr>
               <a:lstStyle/>
               <a:p>
+                <a:pPr algn="ctr"/>
                 <a:r>
                   <a:rPr lang="en-US" dirty="0"/>
-                  <a:t>Control Module</a:t>
+                  <a:t>User program</a:t>
+                </a:r>
+              </a:p>
+              <a:p>
+                <a:pPr algn="ctr"/>
+                <a:r>
+                  <a:rPr lang="en-US" dirty="0"/>
+                  <a:t> Module</a:t>
                 </a:r>
               </a:p>
             </p:txBody>
@@ -3520,7 +3528,7 @@
           </p:nvSpPr>
           <p:spPr>
             <a:xfrm>
-              <a:off x="5187399" y="2114345"/>
+              <a:off x="5250029" y="1522963"/>
               <a:ext cx="2054268" cy="764087"/>
             </a:xfrm>
             <a:prstGeom prst="rect">
@@ -3572,7 +3580,7 @@
           </p:nvSpPr>
           <p:spPr>
             <a:xfrm>
-              <a:off x="5775631" y="2311722"/>
+              <a:off x="5809498" y="1734669"/>
               <a:ext cx="877804" cy="369332"/>
             </a:xfrm>
             <a:prstGeom prst="rect">
@@ -3607,7 +3615,7 @@
           </p:nvSpPr>
           <p:spPr>
             <a:xfrm>
-              <a:off x="9381066" y="2286002"/>
+              <a:off x="9286662" y="4268816"/>
               <a:ext cx="856325" cy="369332"/>
             </a:xfrm>
             <a:prstGeom prst="rect">
@@ -3642,7 +3650,7 @@
           </p:nvSpPr>
           <p:spPr>
             <a:xfrm>
-              <a:off x="1324535" y="2081639"/>
+              <a:off x="1387439" y="4136181"/>
               <a:ext cx="2054268" cy="764087"/>
             </a:xfrm>
             <a:prstGeom prst="rect">
@@ -3694,7 +3702,7 @@
           </p:nvSpPr>
           <p:spPr>
             <a:xfrm>
-              <a:off x="1954609" y="2283677"/>
+              <a:off x="1930163" y="4293472"/>
               <a:ext cx="684803" cy="369332"/>
             </a:xfrm>
             <a:prstGeom prst="rect">
@@ -3708,6 +3716,7 @@
             </a:bodyPr>
             <a:lstStyle/>
             <a:p>
+              <a:pPr algn="ctr"/>
               <a:r>
                 <a:rPr lang="en-US" dirty="0"/>
                 <a:t>Input</a:t>
@@ -3729,9 +3738,9 @@
           </p:nvGrpSpPr>
           <p:grpSpPr>
             <a:xfrm>
-              <a:off x="3499638" y="4099371"/>
+              <a:off x="3966580" y="4135000"/>
               <a:ext cx="1941532" cy="764087"/>
-              <a:chOff x="3499638" y="3489772"/>
+              <a:chOff x="3966580" y="3525401"/>
               <a:chExt cx="1941532" cy="764087"/>
             </a:xfrm>
           </p:grpSpPr>
@@ -3749,7 +3758,7 @@
             </p:nvSpPr>
             <p:spPr>
               <a:xfrm>
-                <a:off x="3499638" y="3489772"/>
+                <a:off x="3966580" y="3525401"/>
                 <a:ext cx="1941532" cy="764087"/>
               </a:xfrm>
               <a:prstGeom prst="rect">
@@ -3801,7 +3810,7 @@
             </p:nvSpPr>
             <p:spPr>
               <a:xfrm>
-                <a:off x="3810623" y="3686199"/>
+                <a:off x="4277565" y="3721828"/>
                 <a:ext cx="1410643" cy="369332"/>
               </a:xfrm>
               <a:prstGeom prst="rect">
@@ -3810,7 +3819,7 @@
               <a:noFill/>
             </p:spPr>
             <p:txBody>
-              <a:bodyPr wrap="none" rtlCol="0">
+              <a:bodyPr wrap="square" rtlCol="0">
                 <a:spAutoFit/>
               </a:bodyPr>
               <a:lstStyle/>
@@ -3945,10 +3954,10 @@
           </p:nvGrpSpPr>
           <p:grpSpPr>
             <a:xfrm>
-              <a:off x="8777616" y="4115356"/>
-              <a:ext cx="1707009" cy="764087"/>
-              <a:chOff x="9400888" y="3488822"/>
-              <a:chExt cx="1286933" cy="764087"/>
+              <a:off x="9116970" y="5300106"/>
+              <a:ext cx="1297037" cy="559264"/>
+              <a:chOff x="9656725" y="4673572"/>
+              <a:chExt cx="977850" cy="559264"/>
             </a:xfrm>
           </p:grpSpPr>
           <p:sp>
@@ -3965,8 +3974,8 @@
             </p:nvSpPr>
             <p:spPr>
               <a:xfrm>
-                <a:off x="9400888" y="3488822"/>
-                <a:ext cx="1286933" cy="764087"/>
+                <a:off x="9656725" y="4673572"/>
+                <a:ext cx="977850" cy="559264"/>
               </a:xfrm>
               <a:prstGeom prst="rect">
                 <a:avLst/>
@@ -4017,7 +4026,7 @@
             </p:nvSpPr>
             <p:spPr>
               <a:xfrm>
-                <a:off x="9809228" y="3686199"/>
+                <a:off x="9914970" y="4813399"/>
                 <a:ext cx="554960" cy="369332"/>
               </a:xfrm>
               <a:prstGeom prst="rect">
@@ -4053,9 +4062,9 @@
           </p:nvGrpSpPr>
           <p:grpSpPr>
             <a:xfrm>
-              <a:off x="1953132" y="5661992"/>
+              <a:off x="4301723" y="5957595"/>
               <a:ext cx="2314068" cy="764087"/>
-              <a:chOff x="1953132" y="5661992"/>
+              <a:chOff x="4301723" y="5957595"/>
               <a:chExt cx="2314068" cy="764087"/>
             </a:xfrm>
           </p:grpSpPr>
@@ -4073,7 +4082,7 @@
             </p:nvSpPr>
             <p:spPr>
               <a:xfrm>
-                <a:off x="1953132" y="5661992"/>
+                <a:off x="4301723" y="5957595"/>
                 <a:ext cx="2314068" cy="764087"/>
               </a:xfrm>
               <a:prstGeom prst="rect">
@@ -4125,8 +4134,8 @@
             </p:nvSpPr>
             <p:spPr>
               <a:xfrm>
-                <a:off x="2206777" y="5859369"/>
-                <a:ext cx="1900392" cy="369332"/>
+                <a:off x="4555368" y="6154972"/>
+                <a:ext cx="1958100" cy="369332"/>
               </a:xfrm>
               <a:prstGeom prst="rect">
                 <a:avLst/>
@@ -4149,10 +4158,10 @@
         </p:grpSp>
         <p:cxnSp>
           <p:nvCxnSpPr>
-            <p:cNvPr id="23" name="Straight Connector 22">
+            <p:cNvPr id="29" name="Straight Arrow Connector 28">
               <a:extLst>
                 <a:ext uri="{FF2B5EF4-FFF2-40B4-BE49-F238E27FC236}">
-                  <a16:creationId xmlns:a16="http://schemas.microsoft.com/office/drawing/2014/main" id="{6045E23E-B327-C340-AD97-A3DE84D5E6D1}"/>
+                  <a16:creationId xmlns:a16="http://schemas.microsoft.com/office/drawing/2014/main" id="{2E6E8E1F-EC2F-6746-8574-44DF1405F6BD}"/>
                 </a:ext>
               </a:extLst>
             </p:cNvPr>
@@ -4163,91 +4172,8 @@
           </p:nvCxnSpPr>
           <p:spPr>
             <a:xfrm>
-              <a:off x="643467" y="1592655"/>
-              <a:ext cx="10955866" cy="0"/>
-            </a:xfrm>
-            <a:prstGeom prst="line">
-              <a:avLst/>
-            </a:prstGeom>
-            <a:ln>
-              <a:solidFill>
-                <a:schemeClr val="tx1"/>
-              </a:solidFill>
-            </a:ln>
-          </p:spPr>
-          <p:style>
-            <a:lnRef idx="1">
-              <a:schemeClr val="accent1"/>
-            </a:lnRef>
-            <a:fillRef idx="0">
-              <a:schemeClr val="accent1"/>
-            </a:fillRef>
-            <a:effectRef idx="0">
-              <a:schemeClr val="accent1"/>
-            </a:effectRef>
-            <a:fontRef idx="minor">
-              <a:schemeClr val="tx1"/>
-            </a:fontRef>
-          </p:style>
-        </p:cxnSp>
-        <p:cxnSp>
-          <p:nvCxnSpPr>
-            <p:cNvPr id="29" name="Straight Arrow Connector 28">
-              <a:extLst>
-                <a:ext uri="{FF2B5EF4-FFF2-40B4-BE49-F238E27FC236}">
-                  <a16:creationId xmlns:a16="http://schemas.microsoft.com/office/drawing/2014/main" id="{2E6E8E1F-EC2F-6746-8574-44DF1405F6BD}"/>
-                </a:ext>
-              </a:extLst>
-            </p:cNvPr>
-            <p:cNvCxnSpPr/>
-            <p:nvPr/>
-          </p:nvCxnSpPr>
-          <p:spPr>
-            <a:xfrm>
-              <a:off x="2351669" y="1592655"/>
-              <a:ext cx="0" cy="488984"/>
-            </a:xfrm>
-            <a:prstGeom prst="straightConnector1">
-              <a:avLst/>
-            </a:prstGeom>
-            <a:ln>
-              <a:solidFill>
-                <a:schemeClr val="tx1"/>
-              </a:solidFill>
-              <a:tailEnd type="triangle"/>
-            </a:ln>
-          </p:spPr>
-          <p:style>
-            <a:lnRef idx="1">
-              <a:schemeClr val="accent1"/>
-            </a:lnRef>
-            <a:fillRef idx="0">
-              <a:schemeClr val="accent1"/>
-            </a:fillRef>
-            <a:effectRef idx="0">
-              <a:schemeClr val="accent1"/>
-            </a:effectRef>
-            <a:fontRef idx="minor">
-              <a:schemeClr val="tx1"/>
-            </a:fontRef>
-          </p:style>
-        </p:cxnSp>
-        <p:cxnSp>
-          <p:nvCxnSpPr>
-            <p:cNvPr id="30" name="Straight Arrow Connector 29">
-              <a:extLst>
-                <a:ext uri="{FF2B5EF4-FFF2-40B4-BE49-F238E27FC236}">
-                  <a16:creationId xmlns:a16="http://schemas.microsoft.com/office/drawing/2014/main" id="{A2727583-AEBA-154B-96A7-CF32DF2B57D7}"/>
-                </a:ext>
-              </a:extLst>
-            </p:cNvPr>
-            <p:cNvCxnSpPr/>
-            <p:nvPr/>
-          </p:nvCxnSpPr>
-          <p:spPr>
-            <a:xfrm>
-              <a:off x="6248400" y="1625361"/>
-              <a:ext cx="0" cy="488984"/>
+              <a:off x="2439487" y="1969248"/>
+              <a:ext cx="0" cy="2148426"/>
             </a:xfrm>
             <a:prstGeom prst="straightConnector1">
               <a:avLst/>
@@ -4283,13 +4209,15 @@
                 </a:ext>
               </a:extLst>
             </p:cNvPr>
-            <p:cNvCxnSpPr/>
+            <p:cNvCxnSpPr>
+              <a:cxnSpLocks/>
+            </p:cNvCxnSpPr>
             <p:nvPr/>
           </p:nvCxnSpPr>
           <p:spPr>
             <a:xfrm>
-              <a:off x="9809228" y="1625361"/>
-              <a:ext cx="0" cy="488984"/>
+              <a:off x="9714824" y="1937971"/>
+              <a:ext cx="1" cy="2187120"/>
             </a:xfrm>
             <a:prstGeom prst="straightConnector1">
               <a:avLst/>
@@ -4299,49 +4227,6 @@
                 <a:schemeClr val="tx1"/>
               </a:solidFill>
               <a:tailEnd type="triangle"/>
-            </a:ln>
-          </p:spPr>
-          <p:style>
-            <a:lnRef idx="1">
-              <a:schemeClr val="accent1"/>
-            </a:lnRef>
-            <a:fillRef idx="0">
-              <a:schemeClr val="accent1"/>
-            </a:fillRef>
-            <a:effectRef idx="0">
-              <a:schemeClr val="accent1"/>
-            </a:effectRef>
-            <a:fontRef idx="minor">
-              <a:schemeClr val="tx1"/>
-            </a:fontRef>
-          </p:style>
-        </p:cxnSp>
-        <p:cxnSp>
-          <p:nvCxnSpPr>
-            <p:cNvPr id="32" name="Straight Connector 31">
-              <a:extLst>
-                <a:ext uri="{FF2B5EF4-FFF2-40B4-BE49-F238E27FC236}">
-                  <a16:creationId xmlns:a16="http://schemas.microsoft.com/office/drawing/2014/main" id="{B9119889-C9FE-7A44-8E6D-965562D4085B}"/>
-                </a:ext>
-              </a:extLst>
-            </p:cNvPr>
-            <p:cNvCxnSpPr>
-              <a:cxnSpLocks/>
-            </p:cNvCxnSpPr>
-            <p:nvPr/>
-          </p:nvCxnSpPr>
-          <p:spPr>
-            <a:xfrm>
-              <a:off x="4267200" y="3370650"/>
-              <a:ext cx="3166533" cy="0"/>
-            </a:xfrm>
-            <a:prstGeom prst="line">
-              <a:avLst/>
-            </a:prstGeom>
-            <a:ln>
-              <a:solidFill>
-                <a:schemeClr val="tx1"/>
-              </a:solidFill>
             </a:ln>
           </p:spPr>
           <p:style>
@@ -4375,8 +4260,8 @@
           </p:nvCxnSpPr>
           <p:spPr>
             <a:xfrm>
-              <a:off x="4267200" y="3370650"/>
-              <a:ext cx="0" cy="744706"/>
+              <a:off x="4553688" y="1934906"/>
+              <a:ext cx="0" cy="2203411"/>
             </a:xfrm>
             <a:prstGeom prst="straightConnector1">
               <a:avLst/>
@@ -4419,8 +4304,8 @@
           </p:nvCxnSpPr>
           <p:spPr>
             <a:xfrm>
-              <a:off x="7450666" y="3370650"/>
-              <a:ext cx="0" cy="744706"/>
+              <a:off x="7763817" y="1919335"/>
+              <a:ext cx="0" cy="2180036"/>
             </a:xfrm>
             <a:prstGeom prst="straightConnector1">
               <a:avLst/>
@@ -4430,92 +4315,6 @@
                 <a:schemeClr val="tx1"/>
               </a:solidFill>
               <a:tailEnd type="triangle"/>
-            </a:ln>
-          </p:spPr>
-          <p:style>
-            <a:lnRef idx="1">
-              <a:schemeClr val="accent1"/>
-            </a:lnRef>
-            <a:fillRef idx="0">
-              <a:schemeClr val="accent1"/>
-            </a:fillRef>
-            <a:effectRef idx="0">
-              <a:schemeClr val="accent1"/>
-            </a:effectRef>
-            <a:fontRef idx="minor">
-              <a:schemeClr val="tx1"/>
-            </a:fontRef>
-          </p:style>
-        </p:cxnSp>
-        <p:cxnSp>
-          <p:nvCxnSpPr>
-            <p:cNvPr id="42" name="Straight Connector 41">
-              <a:extLst>
-                <a:ext uri="{FF2B5EF4-FFF2-40B4-BE49-F238E27FC236}">
-                  <a16:creationId xmlns:a16="http://schemas.microsoft.com/office/drawing/2014/main" id="{BC766C85-676D-6E4E-AEA5-77EE5E49926F}"/>
-                </a:ext>
-              </a:extLst>
-            </p:cNvPr>
-            <p:cNvCxnSpPr>
-              <a:cxnSpLocks/>
-            </p:cNvCxnSpPr>
-            <p:nvPr/>
-          </p:nvCxnSpPr>
-          <p:spPr>
-            <a:xfrm flipH="1">
-              <a:off x="6214533" y="2907670"/>
-              <a:ext cx="1" cy="459746"/>
-            </a:xfrm>
-            <a:prstGeom prst="line">
-              <a:avLst/>
-            </a:prstGeom>
-            <a:ln>
-              <a:solidFill>
-                <a:schemeClr val="tx1"/>
-              </a:solidFill>
-            </a:ln>
-          </p:spPr>
-          <p:style>
-            <a:lnRef idx="1">
-              <a:schemeClr val="accent1"/>
-            </a:lnRef>
-            <a:fillRef idx="0">
-              <a:schemeClr val="accent1"/>
-            </a:fillRef>
-            <a:effectRef idx="0">
-              <a:schemeClr val="accent1"/>
-            </a:effectRef>
-            <a:fontRef idx="minor">
-              <a:schemeClr val="tx1"/>
-            </a:fontRef>
-          </p:style>
-        </p:cxnSp>
-        <p:cxnSp>
-          <p:nvCxnSpPr>
-            <p:cNvPr id="45" name="Straight Connector 44">
-              <a:extLst>
-                <a:ext uri="{FF2B5EF4-FFF2-40B4-BE49-F238E27FC236}">
-                  <a16:creationId xmlns:a16="http://schemas.microsoft.com/office/drawing/2014/main" id="{1A5CB3A0-4F40-874C-8D2D-6FE9337DBB8B}"/>
-                </a:ext>
-              </a:extLst>
-            </p:cNvPr>
-            <p:cNvCxnSpPr>
-              <a:cxnSpLocks/>
-            </p:cNvCxnSpPr>
-            <p:nvPr/>
-          </p:nvCxnSpPr>
-          <p:spPr>
-            <a:xfrm flipH="1">
-              <a:off x="6270900" y="1146928"/>
-              <a:ext cx="1" cy="459746"/>
-            </a:xfrm>
-            <a:prstGeom prst="line">
-              <a:avLst/>
-            </a:prstGeom>
-            <a:ln>
-              <a:solidFill>
-                <a:schemeClr val="tx1"/>
-              </a:solidFill>
             </a:ln>
           </p:spPr>
           <p:style>
@@ -4548,184 +4347,9 @@
             <p:nvPr/>
           </p:nvCxnSpPr>
           <p:spPr>
-            <a:xfrm>
-              <a:off x="9809228" y="2845726"/>
-              <a:ext cx="0" cy="1253645"/>
-            </a:xfrm>
-            <a:prstGeom prst="straightConnector1">
-              <a:avLst/>
-            </a:prstGeom>
-            <a:ln>
-              <a:solidFill>
-                <a:schemeClr val="tx1"/>
-              </a:solidFill>
-              <a:tailEnd type="triangle"/>
-            </a:ln>
-          </p:spPr>
-          <p:style>
-            <a:lnRef idx="1">
-              <a:schemeClr val="accent1"/>
-            </a:lnRef>
-            <a:fillRef idx="0">
-              <a:schemeClr val="accent1"/>
-            </a:fillRef>
-            <a:effectRef idx="0">
-              <a:schemeClr val="accent1"/>
-            </a:effectRef>
-            <a:fontRef idx="minor">
-              <a:schemeClr val="tx1"/>
-            </a:fontRef>
-          </p:style>
-        </p:cxnSp>
-        <p:cxnSp>
-          <p:nvCxnSpPr>
-            <p:cNvPr id="50" name="Straight Connector 49">
-              <a:extLst>
-                <a:ext uri="{FF2B5EF4-FFF2-40B4-BE49-F238E27FC236}">
-                  <a16:creationId xmlns:a16="http://schemas.microsoft.com/office/drawing/2014/main" id="{1E27C964-0192-9742-8E9F-3543B4BCAE6B}"/>
-                </a:ext>
-              </a:extLst>
-            </p:cNvPr>
-            <p:cNvCxnSpPr>
-              <a:cxnSpLocks/>
-            </p:cNvCxnSpPr>
-            <p:nvPr/>
-          </p:nvCxnSpPr>
-          <p:spPr>
-            <a:xfrm>
-              <a:off x="657150" y="1608428"/>
-              <a:ext cx="13678" cy="2872038"/>
-            </a:xfrm>
-            <a:prstGeom prst="line">
-              <a:avLst/>
-            </a:prstGeom>
-            <a:ln>
-              <a:solidFill>
-                <a:schemeClr val="tx1"/>
-              </a:solidFill>
-            </a:ln>
-          </p:spPr>
-          <p:style>
-            <a:lnRef idx="1">
-              <a:schemeClr val="accent1"/>
-            </a:lnRef>
-            <a:fillRef idx="0">
-              <a:schemeClr val="accent1"/>
-            </a:fillRef>
-            <a:effectRef idx="0">
-              <a:schemeClr val="accent1"/>
-            </a:effectRef>
-            <a:fontRef idx="minor">
-              <a:schemeClr val="tx1"/>
-            </a:fontRef>
-          </p:style>
-        </p:cxnSp>
-        <p:cxnSp>
-          <p:nvCxnSpPr>
-            <p:cNvPr id="52" name="Straight Arrow Connector 51">
-              <a:extLst>
-                <a:ext uri="{FF2B5EF4-FFF2-40B4-BE49-F238E27FC236}">
-                  <a16:creationId xmlns:a16="http://schemas.microsoft.com/office/drawing/2014/main" id="{FA5819D1-C2A9-5A4D-87E0-B2E9620403FD}"/>
-                </a:ext>
-              </a:extLst>
-            </p:cNvPr>
-            <p:cNvCxnSpPr>
-              <a:cxnSpLocks/>
-            </p:cNvCxnSpPr>
-            <p:nvPr/>
-          </p:nvCxnSpPr>
-          <p:spPr>
-            <a:xfrm flipV="1">
-              <a:off x="643467" y="4464482"/>
-              <a:ext cx="2856171" cy="15984"/>
-            </a:xfrm>
-            <a:prstGeom prst="straightConnector1">
-              <a:avLst/>
-            </a:prstGeom>
-            <a:ln>
-              <a:solidFill>
-                <a:schemeClr val="tx1"/>
-              </a:solidFill>
-              <a:tailEnd type="triangle"/>
-            </a:ln>
-          </p:spPr>
-          <p:style>
-            <a:lnRef idx="1">
-              <a:schemeClr val="accent1"/>
-            </a:lnRef>
-            <a:fillRef idx="0">
-              <a:schemeClr val="accent1"/>
-            </a:fillRef>
-            <a:effectRef idx="0">
-              <a:schemeClr val="accent1"/>
-            </a:effectRef>
-            <a:fontRef idx="minor">
-              <a:schemeClr val="tx1"/>
-            </a:fontRef>
-          </p:style>
-        </p:cxnSp>
-        <p:cxnSp>
-          <p:nvCxnSpPr>
-            <p:cNvPr id="56" name="Straight Connector 55">
-              <a:extLst>
-                <a:ext uri="{FF2B5EF4-FFF2-40B4-BE49-F238E27FC236}">
-                  <a16:creationId xmlns:a16="http://schemas.microsoft.com/office/drawing/2014/main" id="{B6C8E0BC-4471-0545-9A0F-8FBB90E92751}"/>
-                </a:ext>
-              </a:extLst>
-            </p:cNvPr>
-            <p:cNvCxnSpPr>
-              <a:cxnSpLocks/>
-            </p:cNvCxnSpPr>
-            <p:nvPr/>
-          </p:nvCxnSpPr>
-          <p:spPr>
-            <a:xfrm>
-              <a:off x="11613016" y="1592444"/>
-              <a:ext cx="13678" cy="2904955"/>
-            </a:xfrm>
-            <a:prstGeom prst="line">
-              <a:avLst/>
-            </a:prstGeom>
-            <a:ln>
-              <a:solidFill>
-                <a:schemeClr val="tx1"/>
-              </a:solidFill>
-            </a:ln>
-          </p:spPr>
-          <p:style>
-            <a:lnRef idx="1">
-              <a:schemeClr val="accent1"/>
-            </a:lnRef>
-            <a:fillRef idx="0">
-              <a:schemeClr val="accent1"/>
-            </a:fillRef>
-            <a:effectRef idx="0">
-              <a:schemeClr val="accent1"/>
-            </a:effectRef>
-            <a:fontRef idx="minor">
-              <a:schemeClr val="tx1"/>
-            </a:fontRef>
-          </p:style>
-        </p:cxnSp>
-        <p:cxnSp>
-          <p:nvCxnSpPr>
-            <p:cNvPr id="57" name="Straight Arrow Connector 56">
-              <a:extLst>
-                <a:ext uri="{FF2B5EF4-FFF2-40B4-BE49-F238E27FC236}">
-                  <a16:creationId xmlns:a16="http://schemas.microsoft.com/office/drawing/2014/main" id="{CD795C8E-99FC-9F48-B75D-6F2342057F32}"/>
-                </a:ext>
-              </a:extLst>
-            </p:cNvPr>
-            <p:cNvCxnSpPr>
-              <a:cxnSpLocks/>
-              <a:endCxn id="16" idx="3"/>
-            </p:cNvCxnSpPr>
-            <p:nvPr/>
-          </p:nvCxnSpPr>
-          <p:spPr>
             <a:xfrm flipH="1">
-              <a:off x="10484625" y="4497400"/>
-              <a:ext cx="1142070" cy="0"/>
+              <a:off x="9714824" y="4856472"/>
+              <a:ext cx="1" cy="443634"/>
             </a:xfrm>
             <a:prstGeom prst="straightConnector1">
               <a:avLst/>
@@ -4766,7 +4390,7 @@
           </p:nvCxnSpPr>
           <p:spPr>
             <a:xfrm>
-              <a:off x="2071552" y="5173008"/>
+              <a:off x="4420143" y="5468611"/>
               <a:ext cx="0" cy="488984"/>
             </a:xfrm>
             <a:prstGeom prst="straightConnector1">
@@ -4808,7 +4432,7 @@
           </p:nvCxnSpPr>
           <p:spPr>
             <a:xfrm>
-              <a:off x="2470200" y="5173008"/>
+              <a:off x="4818791" y="5468611"/>
               <a:ext cx="0" cy="488984"/>
             </a:xfrm>
             <a:prstGeom prst="straightConnector1">
@@ -4852,7 +4476,7 @@
           </p:nvCxnSpPr>
           <p:spPr>
             <a:xfrm>
-              <a:off x="2893536" y="5173008"/>
+              <a:off x="5116867" y="5468611"/>
               <a:ext cx="0" cy="488984"/>
             </a:xfrm>
             <a:prstGeom prst="straightConnector1">
@@ -4894,7 +4518,7 @@
           </p:nvCxnSpPr>
           <p:spPr>
             <a:xfrm>
-              <a:off x="3376739" y="5173008"/>
+              <a:off x="5725330" y="5468611"/>
               <a:ext cx="0" cy="488984"/>
             </a:xfrm>
             <a:prstGeom prst="straightConnector1">
@@ -4936,7 +4560,7 @@
           </p:nvCxnSpPr>
           <p:spPr>
             <a:xfrm>
-              <a:off x="3740825" y="5173008"/>
+              <a:off x="6051838" y="5468611"/>
               <a:ext cx="0" cy="488984"/>
             </a:xfrm>
             <a:prstGeom prst="straightConnector1">
@@ -4978,7 +4602,7 @@
           </p:nvCxnSpPr>
           <p:spPr>
             <a:xfrm>
-              <a:off x="4071238" y="5173008"/>
+              <a:off x="6369725" y="5468611"/>
               <a:ext cx="0" cy="488984"/>
             </a:xfrm>
             <a:prstGeom prst="straightConnector1">
@@ -5006,99 +4630,447 @@
             </a:fontRef>
           </p:style>
         </p:cxnSp>
-        <p:cxnSp>
-          <p:nvCxnSpPr>
-            <p:cNvPr id="70" name="Straight Arrow Connector 69">
-              <a:extLst>
-                <a:ext uri="{FF2B5EF4-FFF2-40B4-BE49-F238E27FC236}">
-                  <a16:creationId xmlns:a16="http://schemas.microsoft.com/office/drawing/2014/main" id="{9926814F-375A-4643-A308-FE8149787356}"/>
-                </a:ext>
-              </a:extLst>
-            </p:cNvPr>
-            <p:cNvCxnSpPr>
-              <a:cxnSpLocks/>
-            </p:cNvCxnSpPr>
-            <p:nvPr/>
-          </p:nvCxnSpPr>
-          <p:spPr>
-            <a:xfrm>
-              <a:off x="3740825" y="1633703"/>
-              <a:ext cx="0" cy="2481653"/>
-            </a:xfrm>
-            <a:prstGeom prst="straightConnector1">
-              <a:avLst/>
-            </a:prstGeom>
-            <a:ln>
-              <a:solidFill>
-                <a:schemeClr val="tx1"/>
-              </a:solidFill>
-              <a:tailEnd type="triangle"/>
-            </a:ln>
-          </p:spPr>
-          <p:style>
-            <a:lnRef idx="1">
-              <a:schemeClr val="accent1"/>
-            </a:lnRef>
-            <a:fillRef idx="0">
-              <a:schemeClr val="accent1"/>
-            </a:fillRef>
-            <a:effectRef idx="0">
-              <a:schemeClr val="accent1"/>
-            </a:effectRef>
-            <a:fontRef idx="minor">
+      </p:grpSp>
+      <p:cxnSp>
+        <p:nvCxnSpPr>
+          <p:cNvPr id="48" name="Straight Arrow Connector 47">
+            <a:extLst>
+              <a:ext uri="{FF2B5EF4-FFF2-40B4-BE49-F238E27FC236}">
+                <a16:creationId xmlns:a16="http://schemas.microsoft.com/office/drawing/2014/main" id="{5FCCD42C-EFB4-1D49-B5F7-3085455FDC19}"/>
+              </a:ext>
+            </a:extLst>
+          </p:cNvPr>
+          <p:cNvCxnSpPr>
+            <a:cxnSpLocks/>
+            <a:endCxn id="8" idx="0"/>
+          </p:cNvCxnSpPr>
+          <p:nvPr/>
+        </p:nvCxnSpPr>
+        <p:spPr>
+          <a:xfrm flipH="1">
+            <a:off x="6289689" y="1182669"/>
+            <a:ext cx="11528" cy="353633"/>
+          </a:xfrm>
+          <a:prstGeom prst="straightConnector1">
+            <a:avLst/>
+          </a:prstGeom>
+          <a:ln>
+            <a:solidFill>
               <a:schemeClr val="tx1"/>
-            </a:fontRef>
-          </p:style>
-        </p:cxnSp>
-        <p:cxnSp>
-          <p:nvCxnSpPr>
-            <p:cNvPr id="72" name="Straight Arrow Connector 71">
-              <a:extLst>
-                <a:ext uri="{FF2B5EF4-FFF2-40B4-BE49-F238E27FC236}">
-                  <a16:creationId xmlns:a16="http://schemas.microsoft.com/office/drawing/2014/main" id="{641FB71D-CEC0-1E46-A07A-D6F122A615CB}"/>
-                </a:ext>
-              </a:extLst>
-            </p:cNvPr>
-            <p:cNvCxnSpPr>
-              <a:cxnSpLocks/>
-            </p:cNvCxnSpPr>
-            <p:nvPr/>
-          </p:nvCxnSpPr>
-          <p:spPr>
-            <a:xfrm>
-              <a:off x="7906425" y="1633703"/>
-              <a:ext cx="0" cy="2481653"/>
-            </a:xfrm>
-            <a:prstGeom prst="straightConnector1">
-              <a:avLst/>
-            </a:prstGeom>
-            <a:ln>
-              <a:solidFill>
-                <a:schemeClr val="tx1"/>
-              </a:solidFill>
-              <a:tailEnd type="triangle"/>
-            </a:ln>
-          </p:spPr>
-          <p:style>
-            <a:lnRef idx="1">
-              <a:schemeClr val="accent1"/>
-            </a:lnRef>
-            <a:fillRef idx="0">
-              <a:schemeClr val="accent1"/>
-            </a:fillRef>
-            <a:effectRef idx="0">
-              <a:schemeClr val="accent1"/>
-            </a:effectRef>
-            <a:fontRef idx="minor">
+            </a:solidFill>
+            <a:tailEnd type="triangle"/>
+          </a:ln>
+        </p:spPr>
+        <p:style>
+          <a:lnRef idx="1">
+            <a:schemeClr val="accent1"/>
+          </a:lnRef>
+          <a:fillRef idx="0">
+            <a:schemeClr val="accent1"/>
+          </a:fillRef>
+          <a:effectRef idx="0">
+            <a:schemeClr val="accent1"/>
+          </a:effectRef>
+          <a:fontRef idx="minor">
+            <a:schemeClr val="tx1"/>
+          </a:fontRef>
+        </p:style>
+      </p:cxnSp>
+      <p:cxnSp>
+        <p:nvCxnSpPr>
+          <p:cNvPr id="51" name="Straight Connector 50">
+            <a:extLst>
+              <a:ext uri="{FF2B5EF4-FFF2-40B4-BE49-F238E27FC236}">
+                <a16:creationId xmlns:a16="http://schemas.microsoft.com/office/drawing/2014/main" id="{4E1C3BC7-78D5-E642-8E48-BCAD992A4446}"/>
+              </a:ext>
+            </a:extLst>
+          </p:cNvPr>
+          <p:cNvCxnSpPr>
+            <a:cxnSpLocks/>
+          </p:cNvCxnSpPr>
+          <p:nvPr/>
+        </p:nvCxnSpPr>
+        <p:spPr>
+          <a:xfrm flipV="1">
+            <a:off x="2452013" y="1948245"/>
+            <a:ext cx="2786072" cy="9997"/>
+          </a:xfrm>
+          <a:prstGeom prst="line">
+            <a:avLst/>
+          </a:prstGeom>
+          <a:ln>
+            <a:solidFill>
               <a:schemeClr val="tx1"/>
-            </a:fontRef>
-          </p:style>
-        </p:cxnSp>
-      </p:grpSp>
+            </a:solidFill>
+          </a:ln>
+        </p:spPr>
+        <p:style>
+          <a:lnRef idx="1">
+            <a:schemeClr val="accent1"/>
+          </a:lnRef>
+          <a:fillRef idx="0">
+            <a:schemeClr val="accent1"/>
+          </a:fillRef>
+          <a:effectRef idx="0">
+            <a:schemeClr val="accent1"/>
+          </a:effectRef>
+          <a:fontRef idx="minor">
+            <a:schemeClr val="tx1"/>
+          </a:fontRef>
+        </p:style>
+      </p:cxnSp>
+      <p:cxnSp>
+        <p:nvCxnSpPr>
+          <p:cNvPr id="54" name="Straight Connector 53">
+            <a:extLst>
+              <a:ext uri="{FF2B5EF4-FFF2-40B4-BE49-F238E27FC236}">
+                <a16:creationId xmlns:a16="http://schemas.microsoft.com/office/drawing/2014/main" id="{78D48287-6C1F-B248-AD92-D64AE91EF94D}"/>
+              </a:ext>
+            </a:extLst>
+          </p:cNvPr>
+          <p:cNvCxnSpPr>
+            <a:cxnSpLocks/>
+          </p:cNvCxnSpPr>
+          <p:nvPr/>
+        </p:nvCxnSpPr>
+        <p:spPr>
+          <a:xfrm>
+            <a:off x="7316241" y="1951310"/>
+            <a:ext cx="2411109" cy="0"/>
+          </a:xfrm>
+          <a:prstGeom prst="line">
+            <a:avLst/>
+          </a:prstGeom>
+          <a:ln>
+            <a:solidFill>
+              <a:schemeClr val="tx1"/>
+            </a:solidFill>
+          </a:ln>
+        </p:spPr>
+        <p:style>
+          <a:lnRef idx="1">
+            <a:schemeClr val="accent1"/>
+          </a:lnRef>
+          <a:fillRef idx="0">
+            <a:schemeClr val="accent1"/>
+          </a:fillRef>
+          <a:effectRef idx="0">
+            <a:schemeClr val="accent1"/>
+          </a:effectRef>
+          <a:fontRef idx="minor">
+            <a:schemeClr val="tx1"/>
+          </a:fontRef>
+        </p:style>
+      </p:cxnSp>
+      <p:cxnSp>
+        <p:nvCxnSpPr>
+          <p:cNvPr id="66" name="Straight Arrow Connector 65">
+            <a:extLst>
+              <a:ext uri="{FF2B5EF4-FFF2-40B4-BE49-F238E27FC236}">
+                <a16:creationId xmlns:a16="http://schemas.microsoft.com/office/drawing/2014/main" id="{FB3FE856-7C36-104B-8124-177FB6A68009}"/>
+              </a:ext>
+            </a:extLst>
+          </p:cNvPr>
+          <p:cNvCxnSpPr>
+            <a:cxnSpLocks/>
+          </p:cNvCxnSpPr>
+          <p:nvPr/>
+        </p:nvCxnSpPr>
+        <p:spPr>
+          <a:xfrm>
+            <a:off x="5388303" y="5481950"/>
+            <a:ext cx="0" cy="488984"/>
+          </a:xfrm>
+          <a:prstGeom prst="straightConnector1">
+            <a:avLst/>
+          </a:prstGeom>
+          <a:ln>
+            <a:solidFill>
+              <a:schemeClr val="tx1"/>
+            </a:solidFill>
+            <a:tailEnd type="triangle"/>
+          </a:ln>
+        </p:spPr>
+        <p:style>
+          <a:lnRef idx="1">
+            <a:schemeClr val="accent1"/>
+          </a:lnRef>
+          <a:fillRef idx="0">
+            <a:schemeClr val="accent1"/>
+          </a:fillRef>
+          <a:effectRef idx="0">
+            <a:schemeClr val="accent1"/>
+          </a:effectRef>
+          <a:fontRef idx="minor">
+            <a:schemeClr val="tx1"/>
+          </a:fontRef>
+        </p:style>
+      </p:cxnSp>
+      <p:sp>
+        <p:nvSpPr>
+          <p:cNvPr id="71" name="Rectangle 70">
+            <a:extLst>
+              <a:ext uri="{FF2B5EF4-FFF2-40B4-BE49-F238E27FC236}">
+                <a16:creationId xmlns:a16="http://schemas.microsoft.com/office/drawing/2014/main" id="{0A5291A7-2701-414C-85F0-8A15330843B1}"/>
+              </a:ext>
+            </a:extLst>
+          </p:cNvPr>
+          <p:cNvSpPr/>
+          <p:nvPr/>
+        </p:nvSpPr>
+        <p:spPr>
+          <a:xfrm>
+            <a:off x="1494910" y="5453272"/>
+            <a:ext cx="1297037" cy="559264"/>
+          </a:xfrm>
+          <a:prstGeom prst="rect">
+            <a:avLst/>
+          </a:prstGeom>
+          <a:noFill/>
+          <a:ln>
+            <a:solidFill>
+              <a:schemeClr val="tx1"/>
+            </a:solidFill>
+          </a:ln>
+        </p:spPr>
+        <p:style>
+          <a:lnRef idx="2">
+            <a:schemeClr val="accent1">
+              <a:shade val="50000"/>
+            </a:schemeClr>
+          </a:lnRef>
+          <a:fillRef idx="1">
+            <a:schemeClr val="accent1"/>
+          </a:fillRef>
+          <a:effectRef idx="0">
+            <a:schemeClr val="accent1"/>
+          </a:effectRef>
+          <a:fontRef idx="minor">
+            <a:schemeClr val="lt1"/>
+          </a:fontRef>
+        </p:style>
+        <p:txBody>
+          <a:bodyPr rtlCol="0" anchor="ctr"/>
+          <a:lstStyle/>
+          <a:p>
+            <a:pPr algn="ctr"/>
+            <a:endParaRPr lang="en-US" dirty="0"/>
+          </a:p>
+        </p:txBody>
+      </p:sp>
+      <p:sp>
+        <p:nvSpPr>
+          <p:cNvPr id="73" name="TextBox 72">
+            <a:extLst>
+              <a:ext uri="{FF2B5EF4-FFF2-40B4-BE49-F238E27FC236}">
+                <a16:creationId xmlns:a16="http://schemas.microsoft.com/office/drawing/2014/main" id="{A6196927-D4FD-CB4A-B151-7C47110FF202}"/>
+              </a:ext>
+            </a:extLst>
+          </p:cNvPr>
+          <p:cNvSpPr txBox="1"/>
+          <p:nvPr/>
+        </p:nvSpPr>
+        <p:spPr>
+          <a:xfrm>
+            <a:off x="1857768" y="5548280"/>
+            <a:ext cx="473206" cy="369332"/>
+          </a:xfrm>
+          <a:prstGeom prst="rect">
+            <a:avLst/>
+          </a:prstGeom>
+          <a:noFill/>
+        </p:spPr>
+        <p:txBody>
+          <a:bodyPr wrap="none" rtlCol="0">
+            <a:spAutoFit/>
+          </a:bodyPr>
+          <a:lstStyle/>
+          <a:p>
+            <a:r>
+              <a:rPr lang="en-US" dirty="0"/>
+              <a:t>HH</a:t>
+            </a:r>
+          </a:p>
+        </p:txBody>
+      </p:sp>
+      <p:cxnSp>
+        <p:nvCxnSpPr>
+          <p:cNvPr id="75" name="Straight Arrow Connector 74">
+            <a:extLst>
+              <a:ext uri="{FF2B5EF4-FFF2-40B4-BE49-F238E27FC236}">
+                <a16:creationId xmlns:a16="http://schemas.microsoft.com/office/drawing/2014/main" id="{254ADC63-8312-1E44-BF5D-1B670E625E69}"/>
+              </a:ext>
+            </a:extLst>
+          </p:cNvPr>
+          <p:cNvCxnSpPr>
+            <a:cxnSpLocks/>
+          </p:cNvCxnSpPr>
+          <p:nvPr/>
+        </p:nvCxnSpPr>
+        <p:spPr>
+          <a:xfrm flipH="1">
+            <a:off x="1811276" y="4961319"/>
+            <a:ext cx="1" cy="443634"/>
+          </a:xfrm>
+          <a:prstGeom prst="straightConnector1">
+            <a:avLst/>
+          </a:prstGeom>
+          <a:ln>
+            <a:solidFill>
+              <a:schemeClr val="tx1"/>
+            </a:solidFill>
+            <a:tailEnd type="triangle"/>
+          </a:ln>
+        </p:spPr>
+        <p:style>
+          <a:lnRef idx="1">
+            <a:schemeClr val="accent1"/>
+          </a:lnRef>
+          <a:fillRef idx="0">
+            <a:schemeClr val="accent1"/>
+          </a:fillRef>
+          <a:effectRef idx="0">
+            <a:schemeClr val="accent1"/>
+          </a:effectRef>
+          <a:fontRef idx="minor">
+            <a:schemeClr val="tx1"/>
+          </a:fontRef>
+        </p:style>
+      </p:cxnSp>
+      <p:cxnSp>
+        <p:nvCxnSpPr>
+          <p:cNvPr id="76" name="Straight Connector 75">
+            <a:extLst>
+              <a:ext uri="{FF2B5EF4-FFF2-40B4-BE49-F238E27FC236}">
+                <a16:creationId xmlns:a16="http://schemas.microsoft.com/office/drawing/2014/main" id="{661DC090-4C02-3B4A-B8CD-6A7F90B03F92}"/>
+              </a:ext>
+            </a:extLst>
+          </p:cNvPr>
+          <p:cNvCxnSpPr>
+            <a:cxnSpLocks/>
+          </p:cNvCxnSpPr>
+          <p:nvPr/>
+        </p:nvCxnSpPr>
+        <p:spPr>
+          <a:xfrm flipV="1">
+            <a:off x="2143428" y="5091628"/>
+            <a:ext cx="7328609" cy="21163"/>
+          </a:xfrm>
+          <a:prstGeom prst="line">
+            <a:avLst/>
+          </a:prstGeom>
+          <a:ln>
+            <a:solidFill>
+              <a:schemeClr val="tx1"/>
+            </a:solidFill>
+          </a:ln>
+        </p:spPr>
+        <p:style>
+          <a:lnRef idx="1">
+            <a:schemeClr val="accent1"/>
+          </a:lnRef>
+          <a:fillRef idx="0">
+            <a:schemeClr val="accent1"/>
+          </a:fillRef>
+          <a:effectRef idx="0">
+            <a:schemeClr val="accent1"/>
+          </a:effectRef>
+          <a:fontRef idx="minor">
+            <a:schemeClr val="tx1"/>
+          </a:fontRef>
+        </p:style>
+      </p:cxnSp>
+      <p:cxnSp>
+        <p:nvCxnSpPr>
+          <p:cNvPr id="77" name="Straight Arrow Connector 76">
+            <a:extLst>
+              <a:ext uri="{FF2B5EF4-FFF2-40B4-BE49-F238E27FC236}">
+                <a16:creationId xmlns:a16="http://schemas.microsoft.com/office/drawing/2014/main" id="{3311235A-A13C-5E4E-9DC1-AE83BA8CB732}"/>
+              </a:ext>
+            </a:extLst>
+          </p:cNvPr>
+          <p:cNvCxnSpPr>
+            <a:cxnSpLocks/>
+          </p:cNvCxnSpPr>
+          <p:nvPr/>
+        </p:nvCxnSpPr>
+        <p:spPr>
+          <a:xfrm flipH="1">
+            <a:off x="2143429" y="5101515"/>
+            <a:ext cx="10390" cy="364283"/>
+          </a:xfrm>
+          <a:prstGeom prst="straightConnector1">
+            <a:avLst/>
+          </a:prstGeom>
+          <a:ln>
+            <a:solidFill>
+              <a:schemeClr val="tx1"/>
+            </a:solidFill>
+            <a:tailEnd type="triangle"/>
+          </a:ln>
+        </p:spPr>
+        <p:style>
+          <a:lnRef idx="1">
+            <a:schemeClr val="accent1"/>
+          </a:lnRef>
+          <a:fillRef idx="0">
+            <a:schemeClr val="accent1"/>
+          </a:fillRef>
+          <a:effectRef idx="0">
+            <a:schemeClr val="accent1"/>
+          </a:effectRef>
+          <a:fontRef idx="minor">
+            <a:schemeClr val="tx1"/>
+          </a:fontRef>
+        </p:style>
+      </p:cxnSp>
+      <p:cxnSp>
+        <p:nvCxnSpPr>
+          <p:cNvPr id="78" name="Straight Connector 77">
+            <a:extLst>
+              <a:ext uri="{FF2B5EF4-FFF2-40B4-BE49-F238E27FC236}">
+                <a16:creationId xmlns:a16="http://schemas.microsoft.com/office/drawing/2014/main" id="{39E68E14-3471-8F47-95B5-76D0E2FC52EA}"/>
+              </a:ext>
+            </a:extLst>
+          </p:cNvPr>
+          <p:cNvCxnSpPr>
+            <a:cxnSpLocks/>
+          </p:cNvCxnSpPr>
+          <p:nvPr/>
+        </p:nvCxnSpPr>
+        <p:spPr>
+          <a:xfrm>
+            <a:off x="9476485" y="4883754"/>
+            <a:ext cx="0" cy="205235"/>
+          </a:xfrm>
+          <a:prstGeom prst="line">
+            <a:avLst/>
+          </a:prstGeom>
+          <a:ln>
+            <a:solidFill>
+              <a:schemeClr val="tx1"/>
+            </a:solidFill>
+          </a:ln>
+        </p:spPr>
+        <p:style>
+          <a:lnRef idx="1">
+            <a:schemeClr val="accent1"/>
+          </a:lnRef>
+          <a:fillRef idx="0">
+            <a:schemeClr val="accent1"/>
+          </a:fillRef>
+          <a:effectRef idx="0">
+            <a:schemeClr val="accent1"/>
+          </a:effectRef>
+          <a:fontRef idx="minor">
+            <a:schemeClr val="tx1"/>
+          </a:fontRef>
+        </p:style>
+      </p:cxnSp>
     </p:spTree>
     <p:extLst>
       <p:ext uri="{BB962C8B-B14F-4D97-AF65-F5344CB8AC3E}">
-        <p14:creationId xmlns:p14="http://schemas.microsoft.com/office/powerpoint/2010/main" val="2140255510"/>
+        <p14:creationId xmlns:p14="http://schemas.microsoft.com/office/powerpoint/2010/main" val="3007534394"/>
       </p:ext>
     </p:extLst>
   </p:cSld>

</xml_diff>

<commit_message>
Adding changes in MG
</commit_message>
<xml_diff>
--- a/docs/Design/MG/UsesHierarchy.pptx
+++ b/docs/Design/MG/UsesHierarchy.pptx
@@ -106,7 +106,7 @@
   </p:defaultTextStyle>
   <p:extLst>
     <p:ext uri="{EFAFB233-063F-42B5-8137-9DF3F51BA10A}">
-      <p15:sldGuideLst xmlns:p15="http://schemas.microsoft.com/office/powerpoint/2012/main"/>
+      <p15:sldGuideLst xmlns:p15="http://schemas.microsoft.com/office/powerpoint/2012/main" xmlns=""/>
     </p:ext>
   </p:extLst>
 </p:presentation>
@@ -134,7 +134,7 @@
           <p:cNvPr id="2" name="Title 1">
             <a:extLst>
               <a:ext uri="{FF2B5EF4-FFF2-40B4-BE49-F238E27FC236}">
-                <a16:creationId xmlns:a16="http://schemas.microsoft.com/office/drawing/2014/main" id="{47AFF899-0D67-0345-8D02-9156E62D3216}"/>
+                <a16:creationId xmlns:a16="http://schemas.microsoft.com/office/drawing/2014/main" xmlns="" id="{47AFF899-0D67-0345-8D02-9156E62D3216}"/>
               </a:ext>
             </a:extLst>
           </p:cNvPr>
@@ -171,7 +171,7 @@
           <p:cNvPr id="3" name="Subtitle 2">
             <a:extLst>
               <a:ext uri="{FF2B5EF4-FFF2-40B4-BE49-F238E27FC236}">
-                <a16:creationId xmlns:a16="http://schemas.microsoft.com/office/drawing/2014/main" id="{D4402774-E781-5641-9C11-243C774E1D03}"/>
+                <a16:creationId xmlns:a16="http://schemas.microsoft.com/office/drawing/2014/main" xmlns="" id="{D4402774-E781-5641-9C11-243C774E1D03}"/>
               </a:ext>
             </a:extLst>
           </p:cNvPr>
@@ -241,7 +241,7 @@
           <p:cNvPr id="4" name="Date Placeholder 3">
             <a:extLst>
               <a:ext uri="{FF2B5EF4-FFF2-40B4-BE49-F238E27FC236}">
-                <a16:creationId xmlns:a16="http://schemas.microsoft.com/office/drawing/2014/main" id="{E56F3546-76AF-6B47-9B0C-98DB0E735E3C}"/>
+                <a16:creationId xmlns:a16="http://schemas.microsoft.com/office/drawing/2014/main" xmlns="" id="{E56F3546-76AF-6B47-9B0C-98DB0E735E3C}"/>
               </a:ext>
             </a:extLst>
           </p:cNvPr>
@@ -259,7 +259,7 @@
           <a:p>
             <a:fld id="{01E2A76B-7CC1-6A45-8BDA-5577ADFF03EE}" type="datetimeFigureOut">
               <a:rPr lang="en-US" smtClean="0"/>
-              <a:t>11/4/18</a:t>
+              <a:t>18-12-24</a:t>
             </a:fld>
             <a:endParaRPr lang="en-US"/>
           </a:p>
@@ -270,7 +270,7 @@
           <p:cNvPr id="5" name="Footer Placeholder 4">
             <a:extLst>
               <a:ext uri="{FF2B5EF4-FFF2-40B4-BE49-F238E27FC236}">
-                <a16:creationId xmlns:a16="http://schemas.microsoft.com/office/drawing/2014/main" id="{1BF007C7-25B4-B049-AC23-60C54A109F39}"/>
+                <a16:creationId xmlns:a16="http://schemas.microsoft.com/office/drawing/2014/main" xmlns="" id="{1BF007C7-25B4-B049-AC23-60C54A109F39}"/>
               </a:ext>
             </a:extLst>
           </p:cNvPr>
@@ -295,7 +295,7 @@
           <p:cNvPr id="6" name="Slide Number Placeholder 5">
             <a:extLst>
               <a:ext uri="{FF2B5EF4-FFF2-40B4-BE49-F238E27FC236}">
-                <a16:creationId xmlns:a16="http://schemas.microsoft.com/office/drawing/2014/main" id="{DF4DCDA2-A053-DF40-AF92-5EBB1017D168}"/>
+                <a16:creationId xmlns:a16="http://schemas.microsoft.com/office/drawing/2014/main" xmlns="" id="{DF4DCDA2-A053-DF40-AF92-5EBB1017D168}"/>
               </a:ext>
             </a:extLst>
           </p:cNvPr>
@@ -354,7 +354,7 @@
           <p:cNvPr id="2" name="Title 1">
             <a:extLst>
               <a:ext uri="{FF2B5EF4-FFF2-40B4-BE49-F238E27FC236}">
-                <a16:creationId xmlns:a16="http://schemas.microsoft.com/office/drawing/2014/main" id="{BAC518F2-D7C7-F247-9522-8809A5F63EEF}"/>
+                <a16:creationId xmlns:a16="http://schemas.microsoft.com/office/drawing/2014/main" xmlns="" id="{BAC518F2-D7C7-F247-9522-8809A5F63EEF}"/>
               </a:ext>
             </a:extLst>
           </p:cNvPr>
@@ -382,7 +382,7 @@
           <p:cNvPr id="3" name="Vertical Text Placeholder 2">
             <a:extLst>
               <a:ext uri="{FF2B5EF4-FFF2-40B4-BE49-F238E27FC236}">
-                <a16:creationId xmlns:a16="http://schemas.microsoft.com/office/drawing/2014/main" id="{0170BBAE-8D79-6446-BAC0-10CD4C9E1FFC}"/>
+                <a16:creationId xmlns:a16="http://schemas.microsoft.com/office/drawing/2014/main" xmlns="" id="{0170BBAE-8D79-6446-BAC0-10CD4C9E1FFC}"/>
               </a:ext>
             </a:extLst>
           </p:cNvPr>
@@ -439,7 +439,7 @@
           <p:cNvPr id="4" name="Date Placeholder 3">
             <a:extLst>
               <a:ext uri="{FF2B5EF4-FFF2-40B4-BE49-F238E27FC236}">
-                <a16:creationId xmlns:a16="http://schemas.microsoft.com/office/drawing/2014/main" id="{248AA13E-9456-AF47-92AB-9C2F8F728EBB}"/>
+                <a16:creationId xmlns:a16="http://schemas.microsoft.com/office/drawing/2014/main" xmlns="" id="{248AA13E-9456-AF47-92AB-9C2F8F728EBB}"/>
               </a:ext>
             </a:extLst>
           </p:cNvPr>
@@ -457,7 +457,7 @@
           <a:p>
             <a:fld id="{01E2A76B-7CC1-6A45-8BDA-5577ADFF03EE}" type="datetimeFigureOut">
               <a:rPr lang="en-US" smtClean="0"/>
-              <a:t>11/4/18</a:t>
+              <a:t>18-12-24</a:t>
             </a:fld>
             <a:endParaRPr lang="en-US"/>
           </a:p>
@@ -468,7 +468,7 @@
           <p:cNvPr id="5" name="Footer Placeholder 4">
             <a:extLst>
               <a:ext uri="{FF2B5EF4-FFF2-40B4-BE49-F238E27FC236}">
-                <a16:creationId xmlns:a16="http://schemas.microsoft.com/office/drawing/2014/main" id="{7F930FBF-3F92-BF47-A294-54CD7848E125}"/>
+                <a16:creationId xmlns:a16="http://schemas.microsoft.com/office/drawing/2014/main" xmlns="" id="{7F930FBF-3F92-BF47-A294-54CD7848E125}"/>
               </a:ext>
             </a:extLst>
           </p:cNvPr>
@@ -493,7 +493,7 @@
           <p:cNvPr id="6" name="Slide Number Placeholder 5">
             <a:extLst>
               <a:ext uri="{FF2B5EF4-FFF2-40B4-BE49-F238E27FC236}">
-                <a16:creationId xmlns:a16="http://schemas.microsoft.com/office/drawing/2014/main" id="{DCD3AAE5-6FA0-D049-95A1-A0AEA7684378}"/>
+                <a16:creationId xmlns:a16="http://schemas.microsoft.com/office/drawing/2014/main" xmlns="" id="{DCD3AAE5-6FA0-D049-95A1-A0AEA7684378}"/>
               </a:ext>
             </a:extLst>
           </p:cNvPr>
@@ -552,7 +552,7 @@
           <p:cNvPr id="2" name="Vertical Title 1">
             <a:extLst>
               <a:ext uri="{FF2B5EF4-FFF2-40B4-BE49-F238E27FC236}">
-                <a16:creationId xmlns:a16="http://schemas.microsoft.com/office/drawing/2014/main" id="{6B8E3164-BE7D-3E45-8295-274264624034}"/>
+                <a16:creationId xmlns:a16="http://schemas.microsoft.com/office/drawing/2014/main" xmlns="" id="{6B8E3164-BE7D-3E45-8295-274264624034}"/>
               </a:ext>
             </a:extLst>
           </p:cNvPr>
@@ -585,7 +585,7 @@
           <p:cNvPr id="3" name="Vertical Text Placeholder 2">
             <a:extLst>
               <a:ext uri="{FF2B5EF4-FFF2-40B4-BE49-F238E27FC236}">
-                <a16:creationId xmlns:a16="http://schemas.microsoft.com/office/drawing/2014/main" id="{96C24037-3B96-6149-8057-03EE037DFCA1}"/>
+                <a16:creationId xmlns:a16="http://schemas.microsoft.com/office/drawing/2014/main" xmlns="" id="{96C24037-3B96-6149-8057-03EE037DFCA1}"/>
               </a:ext>
             </a:extLst>
           </p:cNvPr>
@@ -647,7 +647,7 @@
           <p:cNvPr id="4" name="Date Placeholder 3">
             <a:extLst>
               <a:ext uri="{FF2B5EF4-FFF2-40B4-BE49-F238E27FC236}">
-                <a16:creationId xmlns:a16="http://schemas.microsoft.com/office/drawing/2014/main" id="{3803F15A-A61A-DE4F-B4A7-1724E1FAB591}"/>
+                <a16:creationId xmlns:a16="http://schemas.microsoft.com/office/drawing/2014/main" xmlns="" id="{3803F15A-A61A-DE4F-B4A7-1724E1FAB591}"/>
               </a:ext>
             </a:extLst>
           </p:cNvPr>
@@ -665,7 +665,7 @@
           <a:p>
             <a:fld id="{01E2A76B-7CC1-6A45-8BDA-5577ADFF03EE}" type="datetimeFigureOut">
               <a:rPr lang="en-US" smtClean="0"/>
-              <a:t>11/4/18</a:t>
+              <a:t>18-12-24</a:t>
             </a:fld>
             <a:endParaRPr lang="en-US"/>
           </a:p>
@@ -676,7 +676,7 @@
           <p:cNvPr id="5" name="Footer Placeholder 4">
             <a:extLst>
               <a:ext uri="{FF2B5EF4-FFF2-40B4-BE49-F238E27FC236}">
-                <a16:creationId xmlns:a16="http://schemas.microsoft.com/office/drawing/2014/main" id="{EA12FADE-5751-DE49-9163-B35937B0C281}"/>
+                <a16:creationId xmlns:a16="http://schemas.microsoft.com/office/drawing/2014/main" xmlns="" id="{EA12FADE-5751-DE49-9163-B35937B0C281}"/>
               </a:ext>
             </a:extLst>
           </p:cNvPr>
@@ -701,7 +701,7 @@
           <p:cNvPr id="6" name="Slide Number Placeholder 5">
             <a:extLst>
               <a:ext uri="{FF2B5EF4-FFF2-40B4-BE49-F238E27FC236}">
-                <a16:creationId xmlns:a16="http://schemas.microsoft.com/office/drawing/2014/main" id="{E6F2FCF9-848B-504C-9CCD-AB2E94F23745}"/>
+                <a16:creationId xmlns:a16="http://schemas.microsoft.com/office/drawing/2014/main" xmlns="" id="{E6F2FCF9-848B-504C-9CCD-AB2E94F23745}"/>
               </a:ext>
             </a:extLst>
           </p:cNvPr>
@@ -760,7 +760,7 @@
           <p:cNvPr id="2" name="Title 1">
             <a:extLst>
               <a:ext uri="{FF2B5EF4-FFF2-40B4-BE49-F238E27FC236}">
-                <a16:creationId xmlns:a16="http://schemas.microsoft.com/office/drawing/2014/main" id="{0D080A69-76F5-3D44-8C5D-D867B9B28A34}"/>
+                <a16:creationId xmlns:a16="http://schemas.microsoft.com/office/drawing/2014/main" xmlns="" id="{0D080A69-76F5-3D44-8C5D-D867B9B28A34}"/>
               </a:ext>
             </a:extLst>
           </p:cNvPr>
@@ -788,7 +788,7 @@
           <p:cNvPr id="3" name="Content Placeholder 2">
             <a:extLst>
               <a:ext uri="{FF2B5EF4-FFF2-40B4-BE49-F238E27FC236}">
-                <a16:creationId xmlns:a16="http://schemas.microsoft.com/office/drawing/2014/main" id="{D30EF112-2E8A-3E47-82F4-85DD327A2D79}"/>
+                <a16:creationId xmlns:a16="http://schemas.microsoft.com/office/drawing/2014/main" xmlns="" id="{D30EF112-2E8A-3E47-82F4-85DD327A2D79}"/>
               </a:ext>
             </a:extLst>
           </p:cNvPr>
@@ -845,7 +845,7 @@
           <p:cNvPr id="4" name="Date Placeholder 3">
             <a:extLst>
               <a:ext uri="{FF2B5EF4-FFF2-40B4-BE49-F238E27FC236}">
-                <a16:creationId xmlns:a16="http://schemas.microsoft.com/office/drawing/2014/main" id="{AE622EB8-02B9-B54D-A00B-46DCC012BB34}"/>
+                <a16:creationId xmlns:a16="http://schemas.microsoft.com/office/drawing/2014/main" xmlns="" id="{AE622EB8-02B9-B54D-A00B-46DCC012BB34}"/>
               </a:ext>
             </a:extLst>
           </p:cNvPr>
@@ -863,7 +863,7 @@
           <a:p>
             <a:fld id="{01E2A76B-7CC1-6A45-8BDA-5577ADFF03EE}" type="datetimeFigureOut">
               <a:rPr lang="en-US" smtClean="0"/>
-              <a:t>11/4/18</a:t>
+              <a:t>18-12-24</a:t>
             </a:fld>
             <a:endParaRPr lang="en-US"/>
           </a:p>
@@ -874,7 +874,7 @@
           <p:cNvPr id="5" name="Footer Placeholder 4">
             <a:extLst>
               <a:ext uri="{FF2B5EF4-FFF2-40B4-BE49-F238E27FC236}">
-                <a16:creationId xmlns:a16="http://schemas.microsoft.com/office/drawing/2014/main" id="{7AC37B35-46EE-EF46-A747-B561A667E48E}"/>
+                <a16:creationId xmlns:a16="http://schemas.microsoft.com/office/drawing/2014/main" xmlns="" id="{7AC37B35-46EE-EF46-A747-B561A667E48E}"/>
               </a:ext>
             </a:extLst>
           </p:cNvPr>
@@ -899,7 +899,7 @@
           <p:cNvPr id="6" name="Slide Number Placeholder 5">
             <a:extLst>
               <a:ext uri="{FF2B5EF4-FFF2-40B4-BE49-F238E27FC236}">
-                <a16:creationId xmlns:a16="http://schemas.microsoft.com/office/drawing/2014/main" id="{6CA9CD21-BB79-B94E-84D4-E3DBE027B8DC}"/>
+                <a16:creationId xmlns:a16="http://schemas.microsoft.com/office/drawing/2014/main" xmlns="" id="{6CA9CD21-BB79-B94E-84D4-E3DBE027B8DC}"/>
               </a:ext>
             </a:extLst>
           </p:cNvPr>
@@ -958,7 +958,7 @@
           <p:cNvPr id="2" name="Title 1">
             <a:extLst>
               <a:ext uri="{FF2B5EF4-FFF2-40B4-BE49-F238E27FC236}">
-                <a16:creationId xmlns:a16="http://schemas.microsoft.com/office/drawing/2014/main" id="{6EF6DC17-B935-4A44-B5F9-0E6B1BE9965B}"/>
+                <a16:creationId xmlns:a16="http://schemas.microsoft.com/office/drawing/2014/main" xmlns="" id="{6EF6DC17-B935-4A44-B5F9-0E6B1BE9965B}"/>
               </a:ext>
             </a:extLst>
           </p:cNvPr>
@@ -995,7 +995,7 @@
           <p:cNvPr id="3" name="Text Placeholder 2">
             <a:extLst>
               <a:ext uri="{FF2B5EF4-FFF2-40B4-BE49-F238E27FC236}">
-                <a16:creationId xmlns:a16="http://schemas.microsoft.com/office/drawing/2014/main" id="{E344E53A-FB44-3047-8AD0-31C48A95ABBD}"/>
+                <a16:creationId xmlns:a16="http://schemas.microsoft.com/office/drawing/2014/main" xmlns="" id="{E344E53A-FB44-3047-8AD0-31C48A95ABBD}"/>
               </a:ext>
             </a:extLst>
           </p:cNvPr>
@@ -1120,7 +1120,7 @@
           <p:cNvPr id="4" name="Date Placeholder 3">
             <a:extLst>
               <a:ext uri="{FF2B5EF4-FFF2-40B4-BE49-F238E27FC236}">
-                <a16:creationId xmlns:a16="http://schemas.microsoft.com/office/drawing/2014/main" id="{AE88C01C-4C3F-6A49-8ECC-DDEF2F9211A5}"/>
+                <a16:creationId xmlns:a16="http://schemas.microsoft.com/office/drawing/2014/main" xmlns="" id="{AE88C01C-4C3F-6A49-8ECC-DDEF2F9211A5}"/>
               </a:ext>
             </a:extLst>
           </p:cNvPr>
@@ -1138,7 +1138,7 @@
           <a:p>
             <a:fld id="{01E2A76B-7CC1-6A45-8BDA-5577ADFF03EE}" type="datetimeFigureOut">
               <a:rPr lang="en-US" smtClean="0"/>
-              <a:t>11/4/18</a:t>
+              <a:t>18-12-24</a:t>
             </a:fld>
             <a:endParaRPr lang="en-US"/>
           </a:p>
@@ -1149,7 +1149,7 @@
           <p:cNvPr id="5" name="Footer Placeholder 4">
             <a:extLst>
               <a:ext uri="{FF2B5EF4-FFF2-40B4-BE49-F238E27FC236}">
-                <a16:creationId xmlns:a16="http://schemas.microsoft.com/office/drawing/2014/main" id="{FCF337E6-2E29-4445-852C-596B9BA8106A}"/>
+                <a16:creationId xmlns:a16="http://schemas.microsoft.com/office/drawing/2014/main" xmlns="" id="{FCF337E6-2E29-4445-852C-596B9BA8106A}"/>
               </a:ext>
             </a:extLst>
           </p:cNvPr>
@@ -1174,7 +1174,7 @@
           <p:cNvPr id="6" name="Slide Number Placeholder 5">
             <a:extLst>
               <a:ext uri="{FF2B5EF4-FFF2-40B4-BE49-F238E27FC236}">
-                <a16:creationId xmlns:a16="http://schemas.microsoft.com/office/drawing/2014/main" id="{77168E42-3A26-1040-9F14-E86765C646F3}"/>
+                <a16:creationId xmlns:a16="http://schemas.microsoft.com/office/drawing/2014/main" xmlns="" id="{77168E42-3A26-1040-9F14-E86765C646F3}"/>
               </a:ext>
             </a:extLst>
           </p:cNvPr>
@@ -1233,7 +1233,7 @@
           <p:cNvPr id="2" name="Title 1">
             <a:extLst>
               <a:ext uri="{FF2B5EF4-FFF2-40B4-BE49-F238E27FC236}">
-                <a16:creationId xmlns:a16="http://schemas.microsoft.com/office/drawing/2014/main" id="{3D5C6746-53EB-4045-8EAA-5C89776D6FF2}"/>
+                <a16:creationId xmlns:a16="http://schemas.microsoft.com/office/drawing/2014/main" xmlns="" id="{3D5C6746-53EB-4045-8EAA-5C89776D6FF2}"/>
               </a:ext>
             </a:extLst>
           </p:cNvPr>
@@ -1261,7 +1261,7 @@
           <p:cNvPr id="3" name="Content Placeholder 2">
             <a:extLst>
               <a:ext uri="{FF2B5EF4-FFF2-40B4-BE49-F238E27FC236}">
-                <a16:creationId xmlns:a16="http://schemas.microsoft.com/office/drawing/2014/main" id="{75542C99-CD50-FB4E-98A5-D7527B80649C}"/>
+                <a16:creationId xmlns:a16="http://schemas.microsoft.com/office/drawing/2014/main" xmlns="" id="{75542C99-CD50-FB4E-98A5-D7527B80649C}"/>
               </a:ext>
             </a:extLst>
           </p:cNvPr>
@@ -1323,7 +1323,7 @@
           <p:cNvPr id="4" name="Content Placeholder 3">
             <a:extLst>
               <a:ext uri="{FF2B5EF4-FFF2-40B4-BE49-F238E27FC236}">
-                <a16:creationId xmlns:a16="http://schemas.microsoft.com/office/drawing/2014/main" id="{9446F3DF-B4AD-8D42-9907-323ECA2412DA}"/>
+                <a16:creationId xmlns:a16="http://schemas.microsoft.com/office/drawing/2014/main" xmlns="" id="{9446F3DF-B4AD-8D42-9907-323ECA2412DA}"/>
               </a:ext>
             </a:extLst>
           </p:cNvPr>
@@ -1385,7 +1385,7 @@
           <p:cNvPr id="5" name="Date Placeholder 4">
             <a:extLst>
               <a:ext uri="{FF2B5EF4-FFF2-40B4-BE49-F238E27FC236}">
-                <a16:creationId xmlns:a16="http://schemas.microsoft.com/office/drawing/2014/main" id="{AF88A622-16A5-0A4B-AF78-721F7073C8CB}"/>
+                <a16:creationId xmlns:a16="http://schemas.microsoft.com/office/drawing/2014/main" xmlns="" id="{AF88A622-16A5-0A4B-AF78-721F7073C8CB}"/>
               </a:ext>
             </a:extLst>
           </p:cNvPr>
@@ -1403,7 +1403,7 @@
           <a:p>
             <a:fld id="{01E2A76B-7CC1-6A45-8BDA-5577ADFF03EE}" type="datetimeFigureOut">
               <a:rPr lang="en-US" smtClean="0"/>
-              <a:t>11/4/18</a:t>
+              <a:t>18-12-24</a:t>
             </a:fld>
             <a:endParaRPr lang="en-US"/>
           </a:p>
@@ -1414,7 +1414,7 @@
           <p:cNvPr id="6" name="Footer Placeholder 5">
             <a:extLst>
               <a:ext uri="{FF2B5EF4-FFF2-40B4-BE49-F238E27FC236}">
-                <a16:creationId xmlns:a16="http://schemas.microsoft.com/office/drawing/2014/main" id="{CBDBF693-925A-F843-88A7-C0CD18E4941A}"/>
+                <a16:creationId xmlns:a16="http://schemas.microsoft.com/office/drawing/2014/main" xmlns="" id="{CBDBF693-925A-F843-88A7-C0CD18E4941A}"/>
               </a:ext>
             </a:extLst>
           </p:cNvPr>
@@ -1439,7 +1439,7 @@
           <p:cNvPr id="7" name="Slide Number Placeholder 6">
             <a:extLst>
               <a:ext uri="{FF2B5EF4-FFF2-40B4-BE49-F238E27FC236}">
-                <a16:creationId xmlns:a16="http://schemas.microsoft.com/office/drawing/2014/main" id="{32C241FE-8144-F248-96AC-79CBF227FCE2}"/>
+                <a16:creationId xmlns:a16="http://schemas.microsoft.com/office/drawing/2014/main" xmlns="" id="{32C241FE-8144-F248-96AC-79CBF227FCE2}"/>
               </a:ext>
             </a:extLst>
           </p:cNvPr>
@@ -1498,7 +1498,7 @@
           <p:cNvPr id="2" name="Title 1">
             <a:extLst>
               <a:ext uri="{FF2B5EF4-FFF2-40B4-BE49-F238E27FC236}">
-                <a16:creationId xmlns:a16="http://schemas.microsoft.com/office/drawing/2014/main" id="{84960BC8-1F46-C24F-B4ED-B373B75E6C8D}"/>
+                <a16:creationId xmlns:a16="http://schemas.microsoft.com/office/drawing/2014/main" xmlns="" id="{84960BC8-1F46-C24F-B4ED-B373B75E6C8D}"/>
               </a:ext>
             </a:extLst>
           </p:cNvPr>
@@ -1531,7 +1531,7 @@
           <p:cNvPr id="3" name="Text Placeholder 2">
             <a:extLst>
               <a:ext uri="{FF2B5EF4-FFF2-40B4-BE49-F238E27FC236}">
-                <a16:creationId xmlns:a16="http://schemas.microsoft.com/office/drawing/2014/main" id="{77AF9AB1-6762-844A-9BA0-EB7AA1D5F3DD}"/>
+                <a16:creationId xmlns:a16="http://schemas.microsoft.com/office/drawing/2014/main" xmlns="" id="{77AF9AB1-6762-844A-9BA0-EB7AA1D5F3DD}"/>
               </a:ext>
             </a:extLst>
           </p:cNvPr>
@@ -1602,7 +1602,7 @@
           <p:cNvPr id="4" name="Content Placeholder 3">
             <a:extLst>
               <a:ext uri="{FF2B5EF4-FFF2-40B4-BE49-F238E27FC236}">
-                <a16:creationId xmlns:a16="http://schemas.microsoft.com/office/drawing/2014/main" id="{7972090F-6691-3840-89B7-8F2C9CD6F22F}"/>
+                <a16:creationId xmlns:a16="http://schemas.microsoft.com/office/drawing/2014/main" xmlns="" id="{7972090F-6691-3840-89B7-8F2C9CD6F22F}"/>
               </a:ext>
             </a:extLst>
           </p:cNvPr>
@@ -1664,7 +1664,7 @@
           <p:cNvPr id="5" name="Text Placeholder 4">
             <a:extLst>
               <a:ext uri="{FF2B5EF4-FFF2-40B4-BE49-F238E27FC236}">
-                <a16:creationId xmlns:a16="http://schemas.microsoft.com/office/drawing/2014/main" id="{9EB78470-7FAF-E947-A774-18B9A36A9188}"/>
+                <a16:creationId xmlns:a16="http://schemas.microsoft.com/office/drawing/2014/main" xmlns="" id="{9EB78470-7FAF-E947-A774-18B9A36A9188}"/>
               </a:ext>
             </a:extLst>
           </p:cNvPr>
@@ -1735,7 +1735,7 @@
           <p:cNvPr id="6" name="Content Placeholder 5">
             <a:extLst>
               <a:ext uri="{FF2B5EF4-FFF2-40B4-BE49-F238E27FC236}">
-                <a16:creationId xmlns:a16="http://schemas.microsoft.com/office/drawing/2014/main" id="{3F70CC3A-0206-A14F-8B51-AE89355AC92E}"/>
+                <a16:creationId xmlns:a16="http://schemas.microsoft.com/office/drawing/2014/main" xmlns="" id="{3F70CC3A-0206-A14F-8B51-AE89355AC92E}"/>
               </a:ext>
             </a:extLst>
           </p:cNvPr>
@@ -1797,7 +1797,7 @@
           <p:cNvPr id="7" name="Date Placeholder 6">
             <a:extLst>
               <a:ext uri="{FF2B5EF4-FFF2-40B4-BE49-F238E27FC236}">
-                <a16:creationId xmlns:a16="http://schemas.microsoft.com/office/drawing/2014/main" id="{0B5643BF-521B-4147-9764-2D37EDC33B2F}"/>
+                <a16:creationId xmlns:a16="http://schemas.microsoft.com/office/drawing/2014/main" xmlns="" id="{0B5643BF-521B-4147-9764-2D37EDC33B2F}"/>
               </a:ext>
             </a:extLst>
           </p:cNvPr>
@@ -1815,7 +1815,7 @@
           <a:p>
             <a:fld id="{01E2A76B-7CC1-6A45-8BDA-5577ADFF03EE}" type="datetimeFigureOut">
               <a:rPr lang="en-US" smtClean="0"/>
-              <a:t>11/4/18</a:t>
+              <a:t>18-12-24</a:t>
             </a:fld>
             <a:endParaRPr lang="en-US"/>
           </a:p>
@@ -1826,7 +1826,7 @@
           <p:cNvPr id="8" name="Footer Placeholder 7">
             <a:extLst>
               <a:ext uri="{FF2B5EF4-FFF2-40B4-BE49-F238E27FC236}">
-                <a16:creationId xmlns:a16="http://schemas.microsoft.com/office/drawing/2014/main" id="{117B7D07-3F4E-724D-B002-8D74213DAF0A}"/>
+                <a16:creationId xmlns:a16="http://schemas.microsoft.com/office/drawing/2014/main" xmlns="" id="{117B7D07-3F4E-724D-B002-8D74213DAF0A}"/>
               </a:ext>
             </a:extLst>
           </p:cNvPr>
@@ -1851,7 +1851,7 @@
           <p:cNvPr id="9" name="Slide Number Placeholder 8">
             <a:extLst>
               <a:ext uri="{FF2B5EF4-FFF2-40B4-BE49-F238E27FC236}">
-                <a16:creationId xmlns:a16="http://schemas.microsoft.com/office/drawing/2014/main" id="{407A248C-4FEE-BF4C-B584-2C2DA62EA71A}"/>
+                <a16:creationId xmlns:a16="http://schemas.microsoft.com/office/drawing/2014/main" xmlns="" id="{407A248C-4FEE-BF4C-B584-2C2DA62EA71A}"/>
               </a:ext>
             </a:extLst>
           </p:cNvPr>
@@ -1910,7 +1910,7 @@
           <p:cNvPr id="2" name="Title 1">
             <a:extLst>
               <a:ext uri="{FF2B5EF4-FFF2-40B4-BE49-F238E27FC236}">
-                <a16:creationId xmlns:a16="http://schemas.microsoft.com/office/drawing/2014/main" id="{A5A6EF9B-EFE5-9D43-83FD-71C1FA75C365}"/>
+                <a16:creationId xmlns:a16="http://schemas.microsoft.com/office/drawing/2014/main" xmlns="" id="{A5A6EF9B-EFE5-9D43-83FD-71C1FA75C365}"/>
               </a:ext>
             </a:extLst>
           </p:cNvPr>
@@ -1938,7 +1938,7 @@
           <p:cNvPr id="3" name="Date Placeholder 2">
             <a:extLst>
               <a:ext uri="{FF2B5EF4-FFF2-40B4-BE49-F238E27FC236}">
-                <a16:creationId xmlns:a16="http://schemas.microsoft.com/office/drawing/2014/main" id="{D02B910A-2212-5D45-8CC6-68010FD52AE0}"/>
+                <a16:creationId xmlns:a16="http://schemas.microsoft.com/office/drawing/2014/main" xmlns="" id="{D02B910A-2212-5D45-8CC6-68010FD52AE0}"/>
               </a:ext>
             </a:extLst>
           </p:cNvPr>
@@ -1956,7 +1956,7 @@
           <a:p>
             <a:fld id="{01E2A76B-7CC1-6A45-8BDA-5577ADFF03EE}" type="datetimeFigureOut">
               <a:rPr lang="en-US" smtClean="0"/>
-              <a:t>11/4/18</a:t>
+              <a:t>18-12-24</a:t>
             </a:fld>
             <a:endParaRPr lang="en-US"/>
           </a:p>
@@ -1967,7 +1967,7 @@
           <p:cNvPr id="4" name="Footer Placeholder 3">
             <a:extLst>
               <a:ext uri="{FF2B5EF4-FFF2-40B4-BE49-F238E27FC236}">
-                <a16:creationId xmlns:a16="http://schemas.microsoft.com/office/drawing/2014/main" id="{BCBD322A-FCAC-CA4C-947A-0F936B5C57E7}"/>
+                <a16:creationId xmlns:a16="http://schemas.microsoft.com/office/drawing/2014/main" xmlns="" id="{BCBD322A-FCAC-CA4C-947A-0F936B5C57E7}"/>
               </a:ext>
             </a:extLst>
           </p:cNvPr>
@@ -1992,7 +1992,7 @@
           <p:cNvPr id="5" name="Slide Number Placeholder 4">
             <a:extLst>
               <a:ext uri="{FF2B5EF4-FFF2-40B4-BE49-F238E27FC236}">
-                <a16:creationId xmlns:a16="http://schemas.microsoft.com/office/drawing/2014/main" id="{6614BEF8-C5CE-3D49-B630-CB658DAA9AFF}"/>
+                <a16:creationId xmlns:a16="http://schemas.microsoft.com/office/drawing/2014/main" xmlns="" id="{6614BEF8-C5CE-3D49-B630-CB658DAA9AFF}"/>
               </a:ext>
             </a:extLst>
           </p:cNvPr>
@@ -2051,7 +2051,7 @@
           <p:cNvPr id="2" name="Date Placeholder 1">
             <a:extLst>
               <a:ext uri="{FF2B5EF4-FFF2-40B4-BE49-F238E27FC236}">
-                <a16:creationId xmlns:a16="http://schemas.microsoft.com/office/drawing/2014/main" id="{B5C950CE-743A-634F-AA10-A545451800B3}"/>
+                <a16:creationId xmlns:a16="http://schemas.microsoft.com/office/drawing/2014/main" xmlns="" id="{B5C950CE-743A-634F-AA10-A545451800B3}"/>
               </a:ext>
             </a:extLst>
           </p:cNvPr>
@@ -2069,7 +2069,7 @@
           <a:p>
             <a:fld id="{01E2A76B-7CC1-6A45-8BDA-5577ADFF03EE}" type="datetimeFigureOut">
               <a:rPr lang="en-US" smtClean="0"/>
-              <a:t>11/4/18</a:t>
+              <a:t>18-12-24</a:t>
             </a:fld>
             <a:endParaRPr lang="en-US"/>
           </a:p>
@@ -2080,7 +2080,7 @@
           <p:cNvPr id="3" name="Footer Placeholder 2">
             <a:extLst>
               <a:ext uri="{FF2B5EF4-FFF2-40B4-BE49-F238E27FC236}">
-                <a16:creationId xmlns:a16="http://schemas.microsoft.com/office/drawing/2014/main" id="{D6E2257B-795A-B54F-B443-56145096D6A4}"/>
+                <a16:creationId xmlns:a16="http://schemas.microsoft.com/office/drawing/2014/main" xmlns="" id="{D6E2257B-795A-B54F-B443-56145096D6A4}"/>
               </a:ext>
             </a:extLst>
           </p:cNvPr>
@@ -2105,7 +2105,7 @@
           <p:cNvPr id="4" name="Slide Number Placeholder 3">
             <a:extLst>
               <a:ext uri="{FF2B5EF4-FFF2-40B4-BE49-F238E27FC236}">
-                <a16:creationId xmlns:a16="http://schemas.microsoft.com/office/drawing/2014/main" id="{B192D775-8C70-AC42-801A-F719F53F67EB}"/>
+                <a16:creationId xmlns:a16="http://schemas.microsoft.com/office/drawing/2014/main" xmlns="" id="{B192D775-8C70-AC42-801A-F719F53F67EB}"/>
               </a:ext>
             </a:extLst>
           </p:cNvPr>
@@ -2164,7 +2164,7 @@
           <p:cNvPr id="2" name="Title 1">
             <a:extLst>
               <a:ext uri="{FF2B5EF4-FFF2-40B4-BE49-F238E27FC236}">
-                <a16:creationId xmlns:a16="http://schemas.microsoft.com/office/drawing/2014/main" id="{AF32B262-0606-8C48-BE7A-6039A4A5B611}"/>
+                <a16:creationId xmlns:a16="http://schemas.microsoft.com/office/drawing/2014/main" xmlns="" id="{AF32B262-0606-8C48-BE7A-6039A4A5B611}"/>
               </a:ext>
             </a:extLst>
           </p:cNvPr>
@@ -2201,7 +2201,7 @@
           <p:cNvPr id="3" name="Content Placeholder 2">
             <a:extLst>
               <a:ext uri="{FF2B5EF4-FFF2-40B4-BE49-F238E27FC236}">
-                <a16:creationId xmlns:a16="http://schemas.microsoft.com/office/drawing/2014/main" id="{9DDEDE84-DF32-FB44-9D35-3DC2F744F1EB}"/>
+                <a16:creationId xmlns:a16="http://schemas.microsoft.com/office/drawing/2014/main" xmlns="" id="{9DDEDE84-DF32-FB44-9D35-3DC2F744F1EB}"/>
               </a:ext>
             </a:extLst>
           </p:cNvPr>
@@ -2291,7 +2291,7 @@
           <p:cNvPr id="4" name="Text Placeholder 3">
             <a:extLst>
               <a:ext uri="{FF2B5EF4-FFF2-40B4-BE49-F238E27FC236}">
-                <a16:creationId xmlns:a16="http://schemas.microsoft.com/office/drawing/2014/main" id="{D5ABD843-4DF0-E642-85AA-59138E0019C2}"/>
+                <a16:creationId xmlns:a16="http://schemas.microsoft.com/office/drawing/2014/main" xmlns="" id="{D5ABD843-4DF0-E642-85AA-59138E0019C2}"/>
               </a:ext>
             </a:extLst>
           </p:cNvPr>
@@ -2362,7 +2362,7 @@
           <p:cNvPr id="5" name="Date Placeholder 4">
             <a:extLst>
               <a:ext uri="{FF2B5EF4-FFF2-40B4-BE49-F238E27FC236}">
-                <a16:creationId xmlns:a16="http://schemas.microsoft.com/office/drawing/2014/main" id="{F4F502CB-3548-D648-BE30-3D7E3C03AB76}"/>
+                <a16:creationId xmlns:a16="http://schemas.microsoft.com/office/drawing/2014/main" xmlns="" id="{F4F502CB-3548-D648-BE30-3D7E3C03AB76}"/>
               </a:ext>
             </a:extLst>
           </p:cNvPr>
@@ -2380,7 +2380,7 @@
           <a:p>
             <a:fld id="{01E2A76B-7CC1-6A45-8BDA-5577ADFF03EE}" type="datetimeFigureOut">
               <a:rPr lang="en-US" smtClean="0"/>
-              <a:t>11/4/18</a:t>
+              <a:t>18-12-24</a:t>
             </a:fld>
             <a:endParaRPr lang="en-US"/>
           </a:p>
@@ -2391,7 +2391,7 @@
           <p:cNvPr id="6" name="Footer Placeholder 5">
             <a:extLst>
               <a:ext uri="{FF2B5EF4-FFF2-40B4-BE49-F238E27FC236}">
-                <a16:creationId xmlns:a16="http://schemas.microsoft.com/office/drawing/2014/main" id="{729AAAD3-992A-8F49-A76E-FEC26FD122E2}"/>
+                <a16:creationId xmlns:a16="http://schemas.microsoft.com/office/drawing/2014/main" xmlns="" id="{729AAAD3-992A-8F49-A76E-FEC26FD122E2}"/>
               </a:ext>
             </a:extLst>
           </p:cNvPr>
@@ -2416,7 +2416,7 @@
           <p:cNvPr id="7" name="Slide Number Placeholder 6">
             <a:extLst>
               <a:ext uri="{FF2B5EF4-FFF2-40B4-BE49-F238E27FC236}">
-                <a16:creationId xmlns:a16="http://schemas.microsoft.com/office/drawing/2014/main" id="{2A59AA22-303F-9C4B-A6F9-C9420A67C4F0}"/>
+                <a16:creationId xmlns:a16="http://schemas.microsoft.com/office/drawing/2014/main" xmlns="" id="{2A59AA22-303F-9C4B-A6F9-C9420A67C4F0}"/>
               </a:ext>
             </a:extLst>
           </p:cNvPr>
@@ -2475,7 +2475,7 @@
           <p:cNvPr id="2" name="Title 1">
             <a:extLst>
               <a:ext uri="{FF2B5EF4-FFF2-40B4-BE49-F238E27FC236}">
-                <a16:creationId xmlns:a16="http://schemas.microsoft.com/office/drawing/2014/main" id="{A975ACCF-9913-E544-BD3A-E4432FDE4861}"/>
+                <a16:creationId xmlns:a16="http://schemas.microsoft.com/office/drawing/2014/main" xmlns="" id="{A975ACCF-9913-E544-BD3A-E4432FDE4861}"/>
               </a:ext>
             </a:extLst>
           </p:cNvPr>
@@ -2512,7 +2512,7 @@
           <p:cNvPr id="3" name="Picture Placeholder 2">
             <a:extLst>
               <a:ext uri="{FF2B5EF4-FFF2-40B4-BE49-F238E27FC236}">
-                <a16:creationId xmlns:a16="http://schemas.microsoft.com/office/drawing/2014/main" id="{5E2BB591-4B4E-F149-8FE2-E321B7D53BA3}"/>
+                <a16:creationId xmlns:a16="http://schemas.microsoft.com/office/drawing/2014/main" xmlns="" id="{5E2BB591-4B4E-F149-8FE2-E321B7D53BA3}"/>
               </a:ext>
             </a:extLst>
           </p:cNvPr>
@@ -2579,7 +2579,7 @@
           <p:cNvPr id="4" name="Text Placeholder 3">
             <a:extLst>
               <a:ext uri="{FF2B5EF4-FFF2-40B4-BE49-F238E27FC236}">
-                <a16:creationId xmlns:a16="http://schemas.microsoft.com/office/drawing/2014/main" id="{93A9B93F-656A-0F4B-85C4-88BB3C820674}"/>
+                <a16:creationId xmlns:a16="http://schemas.microsoft.com/office/drawing/2014/main" xmlns="" id="{93A9B93F-656A-0F4B-85C4-88BB3C820674}"/>
               </a:ext>
             </a:extLst>
           </p:cNvPr>
@@ -2650,7 +2650,7 @@
           <p:cNvPr id="5" name="Date Placeholder 4">
             <a:extLst>
               <a:ext uri="{FF2B5EF4-FFF2-40B4-BE49-F238E27FC236}">
-                <a16:creationId xmlns:a16="http://schemas.microsoft.com/office/drawing/2014/main" id="{17204B57-312F-B14C-9002-3453D44A3137}"/>
+                <a16:creationId xmlns:a16="http://schemas.microsoft.com/office/drawing/2014/main" xmlns="" id="{17204B57-312F-B14C-9002-3453D44A3137}"/>
               </a:ext>
             </a:extLst>
           </p:cNvPr>
@@ -2668,7 +2668,7 @@
           <a:p>
             <a:fld id="{01E2A76B-7CC1-6A45-8BDA-5577ADFF03EE}" type="datetimeFigureOut">
               <a:rPr lang="en-US" smtClean="0"/>
-              <a:t>11/4/18</a:t>
+              <a:t>18-12-24</a:t>
             </a:fld>
             <a:endParaRPr lang="en-US"/>
           </a:p>
@@ -2679,7 +2679,7 @@
           <p:cNvPr id="6" name="Footer Placeholder 5">
             <a:extLst>
               <a:ext uri="{FF2B5EF4-FFF2-40B4-BE49-F238E27FC236}">
-                <a16:creationId xmlns:a16="http://schemas.microsoft.com/office/drawing/2014/main" id="{D3D42279-4CC6-0849-B14A-E141D8DCAA13}"/>
+                <a16:creationId xmlns:a16="http://schemas.microsoft.com/office/drawing/2014/main" xmlns="" id="{D3D42279-4CC6-0849-B14A-E141D8DCAA13}"/>
               </a:ext>
             </a:extLst>
           </p:cNvPr>
@@ -2704,7 +2704,7 @@
           <p:cNvPr id="7" name="Slide Number Placeholder 6">
             <a:extLst>
               <a:ext uri="{FF2B5EF4-FFF2-40B4-BE49-F238E27FC236}">
-                <a16:creationId xmlns:a16="http://schemas.microsoft.com/office/drawing/2014/main" id="{25A262CA-5E01-FB4F-8097-46805A866CDA}"/>
+                <a16:creationId xmlns:a16="http://schemas.microsoft.com/office/drawing/2014/main" xmlns="" id="{25A262CA-5E01-FB4F-8097-46805A866CDA}"/>
               </a:ext>
             </a:extLst>
           </p:cNvPr>
@@ -2768,7 +2768,7 @@
           <p:cNvPr id="2" name="Title Placeholder 1">
             <a:extLst>
               <a:ext uri="{FF2B5EF4-FFF2-40B4-BE49-F238E27FC236}">
-                <a16:creationId xmlns:a16="http://schemas.microsoft.com/office/drawing/2014/main" id="{F4F858A2-2003-B543-AA89-3DF7C6D91958}"/>
+                <a16:creationId xmlns:a16="http://schemas.microsoft.com/office/drawing/2014/main" xmlns="" id="{F4F858A2-2003-B543-AA89-3DF7C6D91958}"/>
               </a:ext>
             </a:extLst>
           </p:cNvPr>
@@ -2806,7 +2806,7 @@
           <p:cNvPr id="3" name="Text Placeholder 2">
             <a:extLst>
               <a:ext uri="{FF2B5EF4-FFF2-40B4-BE49-F238E27FC236}">
-                <a16:creationId xmlns:a16="http://schemas.microsoft.com/office/drawing/2014/main" id="{552586F9-4FD6-634A-9C37-C0D940FBDA0D}"/>
+                <a16:creationId xmlns:a16="http://schemas.microsoft.com/office/drawing/2014/main" xmlns="" id="{552586F9-4FD6-634A-9C37-C0D940FBDA0D}"/>
               </a:ext>
             </a:extLst>
           </p:cNvPr>
@@ -2873,7 +2873,7 @@
           <p:cNvPr id="4" name="Date Placeholder 3">
             <a:extLst>
               <a:ext uri="{FF2B5EF4-FFF2-40B4-BE49-F238E27FC236}">
-                <a16:creationId xmlns:a16="http://schemas.microsoft.com/office/drawing/2014/main" id="{07DF8A6D-C60D-9F40-8395-C248F285E8A2}"/>
+                <a16:creationId xmlns:a16="http://schemas.microsoft.com/office/drawing/2014/main" xmlns="" id="{07DF8A6D-C60D-9F40-8395-C248F285E8A2}"/>
               </a:ext>
             </a:extLst>
           </p:cNvPr>
@@ -2909,7 +2909,7 @@
           <a:p>
             <a:fld id="{01E2A76B-7CC1-6A45-8BDA-5577ADFF03EE}" type="datetimeFigureOut">
               <a:rPr lang="en-US" smtClean="0"/>
-              <a:t>11/4/18</a:t>
+              <a:t>18-12-24</a:t>
             </a:fld>
             <a:endParaRPr lang="en-US"/>
           </a:p>
@@ -2920,7 +2920,7 @@
           <p:cNvPr id="5" name="Footer Placeholder 4">
             <a:extLst>
               <a:ext uri="{FF2B5EF4-FFF2-40B4-BE49-F238E27FC236}">
-                <a16:creationId xmlns:a16="http://schemas.microsoft.com/office/drawing/2014/main" id="{898AEF71-2E9F-4946-9DF5-0668409F920C}"/>
+                <a16:creationId xmlns:a16="http://schemas.microsoft.com/office/drawing/2014/main" xmlns="" id="{898AEF71-2E9F-4946-9DF5-0668409F920C}"/>
               </a:ext>
             </a:extLst>
           </p:cNvPr>
@@ -2963,7 +2963,7 @@
           <p:cNvPr id="6" name="Slide Number Placeholder 5">
             <a:extLst>
               <a:ext uri="{FF2B5EF4-FFF2-40B4-BE49-F238E27FC236}">
-                <a16:creationId xmlns:a16="http://schemas.microsoft.com/office/drawing/2014/main" id="{16D787EF-57F2-C94B-B61D-07A40E192E73}"/>
+                <a16:creationId xmlns:a16="http://schemas.microsoft.com/office/drawing/2014/main" xmlns="" id="{16D787EF-57F2-C94B-B61D-07A40E192E73}"/>
               </a:ext>
             </a:extLst>
           </p:cNvPr>
@@ -3331,7 +3331,7 @@
           <p:cNvPr id="74" name="Group 73">
             <a:extLst>
               <a:ext uri="{FF2B5EF4-FFF2-40B4-BE49-F238E27FC236}">
-                <a16:creationId xmlns:a16="http://schemas.microsoft.com/office/drawing/2014/main" id="{46B406B8-B3B6-B249-B0FA-E8CA3194E7C0}"/>
+                <a16:creationId xmlns:a16="http://schemas.microsoft.com/office/drawing/2014/main" xmlns="" id="{46B406B8-B3B6-B249-B0FA-E8CA3194E7C0}"/>
               </a:ext>
             </a:extLst>
           </p:cNvPr>
@@ -3340,10 +3340,10 @@
         </p:nvGrpSpPr>
         <p:grpSpPr>
           <a:xfrm>
-            <a:off x="1399965" y="418582"/>
-            <a:ext cx="9026568" cy="6316439"/>
-            <a:chOff x="1387439" y="405243"/>
-            <a:chExt cx="9026568" cy="6316439"/>
+            <a:off x="3116761" y="487475"/>
+            <a:ext cx="7294093" cy="6247546"/>
+            <a:chOff x="3119914" y="474136"/>
+            <a:chExt cx="7294093" cy="6247546"/>
           </a:xfrm>
         </p:grpSpPr>
         <p:sp>
@@ -3351,7 +3351,7 @@
             <p:cNvPr id="4" name="Rectangle 3">
               <a:extLst>
                 <a:ext uri="{FF2B5EF4-FFF2-40B4-BE49-F238E27FC236}">
-                  <a16:creationId xmlns:a16="http://schemas.microsoft.com/office/drawing/2014/main" id="{52A17252-A47C-A144-8E47-1F5559FFF148}"/>
+                  <a16:creationId xmlns:a16="http://schemas.microsoft.com/office/drawing/2014/main" xmlns="" id="{52A17252-A47C-A144-8E47-1F5559FFF148}"/>
                 </a:ext>
               </a:extLst>
             </p:cNvPr>
@@ -3360,176 +3360,8 @@
           </p:nvSpPr>
           <p:spPr>
             <a:xfrm>
-              <a:off x="9116967" y="4099371"/>
+              <a:off x="8270301" y="2907691"/>
               <a:ext cx="1202629" cy="764087"/>
-            </a:xfrm>
-            <a:prstGeom prst="rect">
-              <a:avLst/>
-            </a:prstGeom>
-            <a:noFill/>
-            <a:ln>
-              <a:solidFill>
-                <a:schemeClr val="tx1"/>
-              </a:solidFill>
-            </a:ln>
-          </p:spPr>
-          <p:style>
-            <a:lnRef idx="2">
-              <a:schemeClr val="accent1">
-                <a:shade val="50000"/>
-              </a:schemeClr>
-            </a:lnRef>
-            <a:fillRef idx="1">
-              <a:schemeClr val="accent1"/>
-            </a:fillRef>
-            <a:effectRef idx="0">
-              <a:schemeClr val="accent1"/>
-            </a:effectRef>
-            <a:fontRef idx="minor">
-              <a:schemeClr val="lt1"/>
-            </a:fontRef>
-          </p:style>
-          <p:txBody>
-            <a:bodyPr rtlCol="0" anchor="ctr"/>
-            <a:lstStyle/>
-            <a:p>
-              <a:pPr algn="ctr"/>
-              <a:endParaRPr lang="en-US" dirty="0"/>
-            </a:p>
-          </p:txBody>
-        </p:sp>
-        <p:grpSp>
-          <p:nvGrpSpPr>
-            <p:cNvPr id="44" name="Group 43">
-              <a:extLst>
-                <a:ext uri="{FF2B5EF4-FFF2-40B4-BE49-F238E27FC236}">
-                  <a16:creationId xmlns:a16="http://schemas.microsoft.com/office/drawing/2014/main" id="{0C513190-444A-6C40-93A5-B6034FC4BAD7}"/>
-                </a:ext>
-              </a:extLst>
-            </p:cNvPr>
-            <p:cNvGrpSpPr/>
-            <p:nvPr/>
-          </p:nvGrpSpPr>
-          <p:grpSpPr>
-            <a:xfrm>
-              <a:off x="5221266" y="405243"/>
-              <a:ext cx="2054268" cy="764087"/>
-              <a:chOff x="5221266" y="540707"/>
-              <a:chExt cx="2054268" cy="764087"/>
-            </a:xfrm>
-          </p:grpSpPr>
-          <p:sp>
-            <p:nvSpPr>
-              <p:cNvPr id="6" name="TextBox 5">
-                <a:extLst>
-                  <a:ext uri="{FF2B5EF4-FFF2-40B4-BE49-F238E27FC236}">
-                    <a16:creationId xmlns:a16="http://schemas.microsoft.com/office/drawing/2014/main" id="{F146DE89-AFB1-2B44-9426-34C7A81212D6}"/>
-                  </a:ext>
-                </a:extLst>
-              </p:cNvPr>
-              <p:cNvSpPr txBox="1"/>
-              <p:nvPr/>
-            </p:nvSpPr>
-            <p:spPr>
-              <a:xfrm>
-                <a:off x="5534418" y="609600"/>
-                <a:ext cx="1469826" cy="646331"/>
-              </a:xfrm>
-              <a:prstGeom prst="rect">
-                <a:avLst/>
-              </a:prstGeom>
-              <a:noFill/>
-            </p:spPr>
-            <p:txBody>
-              <a:bodyPr wrap="none" rtlCol="0">
-                <a:spAutoFit/>
-              </a:bodyPr>
-              <a:lstStyle/>
-              <a:p>
-                <a:pPr algn="ctr"/>
-                <a:r>
-                  <a:rPr lang="en-US" dirty="0"/>
-                  <a:t>User program</a:t>
-                </a:r>
-              </a:p>
-              <a:p>
-                <a:pPr algn="ctr"/>
-                <a:r>
-                  <a:rPr lang="en-US" dirty="0"/>
-                  <a:t> Module</a:t>
-                </a:r>
-              </a:p>
-            </p:txBody>
-          </p:sp>
-          <p:sp>
-            <p:nvSpPr>
-              <p:cNvPr id="7" name="Rectangle 6">
-                <a:extLst>
-                  <a:ext uri="{FF2B5EF4-FFF2-40B4-BE49-F238E27FC236}">
-                    <a16:creationId xmlns:a16="http://schemas.microsoft.com/office/drawing/2014/main" id="{746B2EFC-7FCE-BA45-B9FF-063C9F72657B}"/>
-                  </a:ext>
-                </a:extLst>
-              </p:cNvPr>
-              <p:cNvSpPr/>
-              <p:nvPr/>
-            </p:nvSpPr>
-            <p:spPr>
-              <a:xfrm>
-                <a:off x="5221266" y="540707"/>
-                <a:ext cx="2054268" cy="764087"/>
-              </a:xfrm>
-              <a:prstGeom prst="rect">
-                <a:avLst/>
-              </a:prstGeom>
-              <a:noFill/>
-              <a:ln>
-                <a:solidFill>
-                  <a:schemeClr val="tx1"/>
-                </a:solidFill>
-              </a:ln>
-            </p:spPr>
-            <p:style>
-              <a:lnRef idx="2">
-                <a:schemeClr val="accent1">
-                  <a:shade val="50000"/>
-                </a:schemeClr>
-              </a:lnRef>
-              <a:fillRef idx="1">
-                <a:schemeClr val="accent1"/>
-              </a:fillRef>
-              <a:effectRef idx="0">
-                <a:schemeClr val="accent1"/>
-              </a:effectRef>
-              <a:fontRef idx="minor">
-                <a:schemeClr val="lt1"/>
-              </a:fontRef>
-            </p:style>
-            <p:txBody>
-              <a:bodyPr rtlCol="0" anchor="ctr"/>
-              <a:lstStyle/>
-              <a:p>
-                <a:pPr algn="ctr"/>
-                <a:endParaRPr lang="en-US" dirty="0"/>
-              </a:p>
-            </p:txBody>
-          </p:sp>
-        </p:grpSp>
-        <p:sp>
-          <p:nvSpPr>
-            <p:cNvPr id="8" name="Rectangle 7">
-              <a:extLst>
-                <a:ext uri="{FF2B5EF4-FFF2-40B4-BE49-F238E27FC236}">
-                  <a16:creationId xmlns:a16="http://schemas.microsoft.com/office/drawing/2014/main" id="{FB554C40-305E-0443-9DD9-949D68987E39}"/>
-                </a:ext>
-              </a:extLst>
-            </p:cNvPr>
-            <p:cNvSpPr/>
-            <p:nvPr/>
-          </p:nvSpPr>
-          <p:spPr>
-            <a:xfrm>
-              <a:off x="5250029" y="1522963"/>
-              <a:ext cx="2054268" cy="764087"/>
             </a:xfrm>
             <a:prstGeom prst="rect">
               <a:avLst/>
@@ -3568,10 +3400,10 @@
         </p:sp>
         <p:sp>
           <p:nvSpPr>
-            <p:cNvPr id="9" name="TextBox 8">
+            <p:cNvPr id="6" name="TextBox 5">
               <a:extLst>
                 <a:ext uri="{FF2B5EF4-FFF2-40B4-BE49-F238E27FC236}">
-                  <a16:creationId xmlns:a16="http://schemas.microsoft.com/office/drawing/2014/main" id="{E37B22F8-2621-3B48-B52D-E8366E24AE89}"/>
+                  <a16:creationId xmlns:a16="http://schemas.microsoft.com/office/drawing/2014/main" xmlns="" id="{F146DE89-AFB1-2B44-9426-34C7A81212D6}"/>
                 </a:ext>
               </a:extLst>
             </p:cNvPr>
@@ -3580,8 +3412,8 @@
           </p:nvSpPr>
           <p:spPr>
             <a:xfrm>
-              <a:off x="5809498" y="1734669"/>
-              <a:ext cx="877804" cy="369332"/>
+              <a:off x="5275579" y="474136"/>
+              <a:ext cx="1469826" cy="646331"/>
             </a:xfrm>
             <a:prstGeom prst="rect">
               <a:avLst/>
@@ -3594,9 +3426,17 @@
             </a:bodyPr>
             <a:lstStyle/>
             <a:p>
+              <a:pPr algn="ctr"/>
               <a:r>
                 <a:rPr lang="en-US" dirty="0"/>
-                <a:t>Best Fit</a:t>
+                <a:t>User program</a:t>
+              </a:r>
+            </a:p>
+            <a:p>
+              <a:pPr algn="ctr"/>
+              <a:r>
+                <a:rPr lang="en-US" dirty="0"/>
+                <a:t> Module</a:t>
               </a:r>
             </a:p>
           </p:txBody>
@@ -3606,7 +3446,7 @@
             <p:cNvPr id="10" name="TextBox 9">
               <a:extLst>
                 <a:ext uri="{FF2B5EF4-FFF2-40B4-BE49-F238E27FC236}">
-                  <a16:creationId xmlns:a16="http://schemas.microsoft.com/office/drawing/2014/main" id="{05B2CF8A-869E-C348-A5E0-DB608E67E049}"/>
+                  <a16:creationId xmlns:a16="http://schemas.microsoft.com/office/drawing/2014/main" xmlns="" id="{05B2CF8A-869E-C348-A5E0-DB608E67E049}"/>
                 </a:ext>
               </a:extLst>
             </p:cNvPr>
@@ -3615,7 +3455,7 @@
           </p:nvSpPr>
           <p:spPr>
             <a:xfrm>
-              <a:off x="9286662" y="4268816"/>
+              <a:off x="8414617" y="3139754"/>
               <a:ext cx="856325" cy="369332"/>
             </a:xfrm>
             <a:prstGeom prst="rect">
@@ -3641,7 +3481,7 @@
             <p:cNvPr id="13" name="Rectangle 12">
               <a:extLst>
                 <a:ext uri="{FF2B5EF4-FFF2-40B4-BE49-F238E27FC236}">
-                  <a16:creationId xmlns:a16="http://schemas.microsoft.com/office/drawing/2014/main" id="{BBCB3961-07E2-B94C-A6D1-2A4AB7B05812}"/>
+                  <a16:creationId xmlns:a16="http://schemas.microsoft.com/office/drawing/2014/main" xmlns="" id="{BBCB3961-07E2-B94C-A6D1-2A4AB7B05812}"/>
                 </a:ext>
               </a:extLst>
             </p:cNvPr>
@@ -3650,7 +3490,7 @@
           </p:nvSpPr>
           <p:spPr>
             <a:xfrm>
-              <a:off x="1387439" y="4136181"/>
+              <a:off x="4698196" y="4280760"/>
               <a:ext cx="2054268" cy="764087"/>
             </a:xfrm>
             <a:prstGeom prst="rect">
@@ -3693,7 +3533,7 @@
             <p:cNvPr id="17" name="TextBox 16">
               <a:extLst>
                 <a:ext uri="{FF2B5EF4-FFF2-40B4-BE49-F238E27FC236}">
-                  <a16:creationId xmlns:a16="http://schemas.microsoft.com/office/drawing/2014/main" id="{6A9C503E-EEE2-4149-8A46-49BA23FE9BB9}"/>
+                  <a16:creationId xmlns:a16="http://schemas.microsoft.com/office/drawing/2014/main" xmlns="" id="{6A9C503E-EEE2-4149-8A46-49BA23FE9BB9}"/>
                 </a:ext>
               </a:extLst>
             </p:cNvPr>
@@ -3702,7 +3542,7 @@
           </p:nvSpPr>
           <p:spPr>
             <a:xfrm>
-              <a:off x="1930163" y="4293472"/>
+              <a:off x="5240920" y="4438051"/>
               <a:ext cx="684803" cy="369332"/>
             </a:xfrm>
             <a:prstGeom prst="rect">
@@ -3729,7 +3569,7 @@
             <p:cNvPr id="35" name="Group 34">
               <a:extLst>
                 <a:ext uri="{FF2B5EF4-FFF2-40B4-BE49-F238E27FC236}">
-                  <a16:creationId xmlns:a16="http://schemas.microsoft.com/office/drawing/2014/main" id="{90F81A12-242D-CE49-B49D-65D7114672D6}"/>
+                  <a16:creationId xmlns:a16="http://schemas.microsoft.com/office/drawing/2014/main" xmlns="" id="{90F81A12-242D-CE49-B49D-65D7114672D6}"/>
                 </a:ext>
               </a:extLst>
             </p:cNvPr>
@@ -3738,9 +3578,9 @@
           </p:nvGrpSpPr>
           <p:grpSpPr>
             <a:xfrm>
-              <a:off x="3966580" y="4135000"/>
+              <a:off x="3119914" y="2943320"/>
               <a:ext cx="1941532" cy="764087"/>
-              <a:chOff x="3966580" y="3525401"/>
+              <a:chOff x="3119914" y="2333721"/>
               <a:chExt cx="1941532" cy="764087"/>
             </a:xfrm>
           </p:grpSpPr>
@@ -3749,7 +3589,7 @@
               <p:cNvPr id="12" name="Rectangle 11">
                 <a:extLst>
                   <a:ext uri="{FF2B5EF4-FFF2-40B4-BE49-F238E27FC236}">
-                    <a16:creationId xmlns:a16="http://schemas.microsoft.com/office/drawing/2014/main" id="{B58B6369-126F-2941-87E5-C8A2E8C36692}"/>
+                    <a16:creationId xmlns:a16="http://schemas.microsoft.com/office/drawing/2014/main" xmlns="" id="{B58B6369-126F-2941-87E5-C8A2E8C36692}"/>
                   </a:ext>
                 </a:extLst>
               </p:cNvPr>
@@ -3758,7 +3598,7 @@
             </p:nvSpPr>
             <p:spPr>
               <a:xfrm>
-                <a:off x="3966580" y="3525401"/>
+                <a:off x="3119914" y="2333721"/>
                 <a:ext cx="1941532" cy="764087"/>
               </a:xfrm>
               <a:prstGeom prst="rect">
@@ -3801,7 +3641,7 @@
               <p:cNvPr id="18" name="TextBox 17">
                 <a:extLst>
                   <a:ext uri="{FF2B5EF4-FFF2-40B4-BE49-F238E27FC236}">
-                    <a16:creationId xmlns:a16="http://schemas.microsoft.com/office/drawing/2014/main" id="{AE8E65B2-7856-944B-A78A-19D681AC66C1}"/>
+                    <a16:creationId xmlns:a16="http://schemas.microsoft.com/office/drawing/2014/main" xmlns="" id="{AE8E65B2-7856-944B-A78A-19D681AC66C1}"/>
                   </a:ext>
                 </a:extLst>
               </p:cNvPr>
@@ -3810,7 +3650,7 @@
             </p:nvSpPr>
             <p:spPr>
               <a:xfrm>
-                <a:off x="4277565" y="3721828"/>
+                <a:off x="3441707" y="2530155"/>
                 <a:ext cx="1410643" cy="369332"/>
               </a:xfrm>
               <a:prstGeom prst="rect">
@@ -3837,7 +3677,7 @@
             <p:cNvPr id="36" name="Group 35">
               <a:extLst>
                 <a:ext uri="{FF2B5EF4-FFF2-40B4-BE49-F238E27FC236}">
-                  <a16:creationId xmlns:a16="http://schemas.microsoft.com/office/drawing/2014/main" id="{4AF0D6CE-DAAE-7746-80EC-694FABD0A985}"/>
+                  <a16:creationId xmlns:a16="http://schemas.microsoft.com/office/drawing/2014/main" xmlns="" id="{4AF0D6CE-DAAE-7746-80EC-694FABD0A985}"/>
                 </a:ext>
               </a:extLst>
             </p:cNvPr>
@@ -3846,9 +3686,9 @@
           </p:nvGrpSpPr>
           <p:grpSpPr>
             <a:xfrm>
-              <a:off x="6270901" y="4106328"/>
+              <a:off x="5424235" y="2914648"/>
               <a:ext cx="1941532" cy="764087"/>
-              <a:chOff x="6270901" y="3429000"/>
+              <a:chOff x="5424235" y="2237320"/>
               <a:chExt cx="1941532" cy="764087"/>
             </a:xfrm>
           </p:grpSpPr>
@@ -3857,7 +3697,7 @@
               <p:cNvPr id="14" name="Rectangle 13">
                 <a:extLst>
                   <a:ext uri="{FF2B5EF4-FFF2-40B4-BE49-F238E27FC236}">
-                    <a16:creationId xmlns:a16="http://schemas.microsoft.com/office/drawing/2014/main" id="{AE7C8441-BD32-FB47-86CC-C662C3ADC128}"/>
+                    <a16:creationId xmlns:a16="http://schemas.microsoft.com/office/drawing/2014/main" xmlns="" id="{AE7C8441-BD32-FB47-86CC-C662C3ADC128}"/>
                   </a:ext>
                 </a:extLst>
               </p:cNvPr>
@@ -3866,7 +3706,7 @@
             </p:nvSpPr>
             <p:spPr>
               <a:xfrm>
-                <a:off x="6270901" y="3429000"/>
+                <a:off x="5424235" y="2237320"/>
                 <a:ext cx="1941532" cy="764087"/>
               </a:xfrm>
               <a:prstGeom prst="rect">
@@ -3909,7 +3749,7 @@
               <p:cNvPr id="19" name="TextBox 18">
                 <a:extLst>
                   <a:ext uri="{FF2B5EF4-FFF2-40B4-BE49-F238E27FC236}">
-                    <a16:creationId xmlns:a16="http://schemas.microsoft.com/office/drawing/2014/main" id="{A3AA4AEA-0849-604C-8B67-344EA66219AB}"/>
+                    <a16:creationId xmlns:a16="http://schemas.microsoft.com/office/drawing/2014/main" xmlns="" id="{A3AA4AEA-0849-604C-8B67-344EA66219AB}"/>
                   </a:ext>
                 </a:extLst>
               </p:cNvPr>
@@ -3918,7 +3758,7 @@
             </p:nvSpPr>
             <p:spPr>
               <a:xfrm>
-                <a:off x="6360379" y="3626377"/>
+                <a:off x="5454570" y="2462426"/>
                 <a:ext cx="1830309" cy="369332"/>
               </a:xfrm>
               <a:prstGeom prst="rect">
@@ -3945,7 +3785,7 @@
             <p:cNvPr id="37" name="Group 36">
               <a:extLst>
                 <a:ext uri="{FF2B5EF4-FFF2-40B4-BE49-F238E27FC236}">
-                  <a16:creationId xmlns:a16="http://schemas.microsoft.com/office/drawing/2014/main" id="{14BFB64B-65DC-CF48-A9E2-062ABA1B6983}"/>
+                  <a16:creationId xmlns:a16="http://schemas.microsoft.com/office/drawing/2014/main" xmlns="" id="{14BFB64B-65DC-CF48-A9E2-062ABA1B6983}"/>
                 </a:ext>
               </a:extLst>
             </p:cNvPr>
@@ -3965,7 +3805,7 @@
               <p:cNvPr id="16" name="Rectangle 15">
                 <a:extLst>
                   <a:ext uri="{FF2B5EF4-FFF2-40B4-BE49-F238E27FC236}">
-                    <a16:creationId xmlns:a16="http://schemas.microsoft.com/office/drawing/2014/main" id="{B1F1D162-F9BA-554D-B089-AA313520CBB9}"/>
+                    <a16:creationId xmlns:a16="http://schemas.microsoft.com/office/drawing/2014/main" xmlns="" id="{B1F1D162-F9BA-554D-B089-AA313520CBB9}"/>
                   </a:ext>
                 </a:extLst>
               </p:cNvPr>
@@ -4017,7 +3857,7 @@
               <p:cNvPr id="20" name="TextBox 19">
                 <a:extLst>
                   <a:ext uri="{FF2B5EF4-FFF2-40B4-BE49-F238E27FC236}">
-                    <a16:creationId xmlns:a16="http://schemas.microsoft.com/office/drawing/2014/main" id="{2AA2BFB6-53DE-D345-B7F8-670551B1C6F5}"/>
+                    <a16:creationId xmlns:a16="http://schemas.microsoft.com/office/drawing/2014/main" xmlns="" id="{2AA2BFB6-53DE-D345-B7F8-670551B1C6F5}"/>
                   </a:ext>
                 </a:extLst>
               </p:cNvPr>
@@ -4053,7 +3893,7 @@
             <p:cNvPr id="38" name="Group 37">
               <a:extLst>
                 <a:ext uri="{FF2B5EF4-FFF2-40B4-BE49-F238E27FC236}">
-                  <a16:creationId xmlns:a16="http://schemas.microsoft.com/office/drawing/2014/main" id="{4B206DD3-6526-564B-974D-D273C97093DB}"/>
+                  <a16:creationId xmlns:a16="http://schemas.microsoft.com/office/drawing/2014/main" xmlns="" id="{4B206DD3-6526-564B-974D-D273C97093DB}"/>
                 </a:ext>
               </a:extLst>
             </p:cNvPr>
@@ -4073,7 +3913,7 @@
               <p:cNvPr id="15" name="Rectangle 14">
                 <a:extLst>
                   <a:ext uri="{FF2B5EF4-FFF2-40B4-BE49-F238E27FC236}">
-                    <a16:creationId xmlns:a16="http://schemas.microsoft.com/office/drawing/2014/main" id="{75446626-9D2F-EE43-81E1-E3A8114CFF1F}"/>
+                    <a16:creationId xmlns:a16="http://schemas.microsoft.com/office/drawing/2014/main" xmlns="" id="{75446626-9D2F-EE43-81E1-E3A8114CFF1F}"/>
                   </a:ext>
                 </a:extLst>
               </p:cNvPr>
@@ -4125,7 +3965,7 @@
               <p:cNvPr id="21" name="TextBox 20">
                 <a:extLst>
                   <a:ext uri="{FF2B5EF4-FFF2-40B4-BE49-F238E27FC236}">
-                    <a16:creationId xmlns:a16="http://schemas.microsoft.com/office/drawing/2014/main" id="{206A9031-E382-3C45-B70B-7E4524BEC5E9}"/>
+                    <a16:creationId xmlns:a16="http://schemas.microsoft.com/office/drawing/2014/main" xmlns="" id="{206A9031-E382-3C45-B70B-7E4524BEC5E9}"/>
                   </a:ext>
                 </a:extLst>
               </p:cNvPr>
@@ -4158,66 +3998,23 @@
         </p:grpSp>
         <p:cxnSp>
           <p:nvCxnSpPr>
-            <p:cNvPr id="29" name="Straight Arrow Connector 28">
+            <p:cNvPr id="31" name="Straight Arrow Connector 30">
               <a:extLst>
                 <a:ext uri="{FF2B5EF4-FFF2-40B4-BE49-F238E27FC236}">
-                  <a16:creationId xmlns:a16="http://schemas.microsoft.com/office/drawing/2014/main" id="{2E6E8E1F-EC2F-6746-8574-44DF1405F6BD}"/>
+                  <a16:creationId xmlns:a16="http://schemas.microsoft.com/office/drawing/2014/main" xmlns="" id="{C388BFAB-A2CB-924B-AE71-547121738A8C}"/>
                 </a:ext>
               </a:extLst>
             </p:cNvPr>
             <p:cNvCxnSpPr>
               <a:cxnSpLocks/>
+              <a:endCxn id="4" idx="0"/>
             </p:cNvCxnSpPr>
             <p:nvPr/>
           </p:nvCxnSpPr>
           <p:spPr>
             <a:xfrm>
-              <a:off x="2439487" y="1969248"/>
-              <a:ext cx="0" cy="2148426"/>
-            </a:xfrm>
-            <a:prstGeom prst="straightConnector1">
-              <a:avLst/>
-            </a:prstGeom>
-            <a:ln>
-              <a:solidFill>
-                <a:schemeClr val="tx1"/>
-              </a:solidFill>
-              <a:tailEnd type="triangle"/>
-            </a:ln>
-          </p:spPr>
-          <p:style>
-            <a:lnRef idx="1">
-              <a:schemeClr val="accent1"/>
-            </a:lnRef>
-            <a:fillRef idx="0">
-              <a:schemeClr val="accent1"/>
-            </a:fillRef>
-            <a:effectRef idx="0">
-              <a:schemeClr val="accent1"/>
-            </a:effectRef>
-            <a:fontRef idx="minor">
-              <a:schemeClr val="tx1"/>
-            </a:fontRef>
-          </p:style>
-        </p:cxnSp>
-        <p:cxnSp>
-          <p:nvCxnSpPr>
-            <p:cNvPr id="31" name="Straight Arrow Connector 30">
-              <a:extLst>
-                <a:ext uri="{FF2B5EF4-FFF2-40B4-BE49-F238E27FC236}">
-                  <a16:creationId xmlns:a16="http://schemas.microsoft.com/office/drawing/2014/main" id="{C388BFAB-A2CB-924B-AE71-547121738A8C}"/>
-                </a:ext>
-              </a:extLst>
-            </p:cNvPr>
-            <p:cNvCxnSpPr>
-              <a:cxnSpLocks/>
-            </p:cNvCxnSpPr>
-            <p:nvPr/>
-          </p:nvCxnSpPr>
-          <p:spPr>
-            <a:xfrm>
-              <a:off x="9714824" y="1937971"/>
-              <a:ext cx="1" cy="2187120"/>
+              <a:off x="8868184" y="1937971"/>
+              <a:ext cx="3432" cy="969720"/>
             </a:xfrm>
             <a:prstGeom prst="straightConnector1">
               <a:avLst/>
@@ -4249,7 +4046,7 @@
             <p:cNvPr id="39" name="Straight Arrow Connector 38">
               <a:extLst>
                 <a:ext uri="{FF2B5EF4-FFF2-40B4-BE49-F238E27FC236}">
-                  <a16:creationId xmlns:a16="http://schemas.microsoft.com/office/drawing/2014/main" id="{3B61AD32-469A-F448-B104-2A1720F9AAFE}"/>
+                  <a16:creationId xmlns:a16="http://schemas.microsoft.com/office/drawing/2014/main" xmlns="" id="{3B61AD32-469A-F448-B104-2A1720F9AAFE}"/>
                 </a:ext>
               </a:extLst>
             </p:cNvPr>
@@ -4260,8 +4057,8 @@
           </p:nvCxnSpPr>
           <p:spPr>
             <a:xfrm>
-              <a:off x="4553688" y="1934906"/>
-              <a:ext cx="0" cy="2203411"/>
+              <a:off x="3942226" y="1919335"/>
+              <a:ext cx="0" cy="1029715"/>
             </a:xfrm>
             <a:prstGeom prst="straightConnector1">
               <a:avLst/>
@@ -4293,7 +4090,7 @@
             <p:cNvPr id="41" name="Straight Arrow Connector 40">
               <a:extLst>
                 <a:ext uri="{FF2B5EF4-FFF2-40B4-BE49-F238E27FC236}">
-                  <a16:creationId xmlns:a16="http://schemas.microsoft.com/office/drawing/2014/main" id="{229F3181-BC00-7C47-86F2-DC310D97B8DF}"/>
+                  <a16:creationId xmlns:a16="http://schemas.microsoft.com/office/drawing/2014/main" xmlns="" id="{229F3181-BC00-7C47-86F2-DC310D97B8DF}"/>
                 </a:ext>
               </a:extLst>
             </p:cNvPr>
@@ -4304,8 +4101,8 @@
           </p:nvCxnSpPr>
           <p:spPr>
             <a:xfrm>
-              <a:off x="7763817" y="1919335"/>
-              <a:ext cx="0" cy="2180036"/>
+              <a:off x="6255025" y="1919335"/>
+              <a:ext cx="0" cy="988356"/>
             </a:xfrm>
             <a:prstGeom prst="straightConnector1">
               <a:avLst/>
@@ -4337,7 +4134,7 @@
             <p:cNvPr id="46" name="Straight Arrow Connector 45">
               <a:extLst>
                 <a:ext uri="{FF2B5EF4-FFF2-40B4-BE49-F238E27FC236}">
-                  <a16:creationId xmlns:a16="http://schemas.microsoft.com/office/drawing/2014/main" id="{22B66451-9F54-E748-AC6A-FAA19D35312F}"/>
+                  <a16:creationId xmlns:a16="http://schemas.microsoft.com/office/drawing/2014/main" xmlns="" id="{22B66451-9F54-E748-AC6A-FAA19D35312F}"/>
                 </a:ext>
               </a:extLst>
             </p:cNvPr>
@@ -4347,9 +4144,9 @@
             <p:nvPr/>
           </p:nvCxnSpPr>
           <p:spPr>
-            <a:xfrm flipH="1">
-              <a:off x="9714824" y="4856472"/>
-              <a:ext cx="1" cy="443634"/>
+            <a:xfrm>
+              <a:off x="9746183" y="3295122"/>
+              <a:ext cx="0" cy="2004984"/>
             </a:xfrm>
             <a:prstGeom prst="straightConnector1">
               <a:avLst/>
@@ -4381,7 +4178,7 @@
             <p:cNvPr id="63" name="Straight Arrow Connector 62">
               <a:extLst>
                 <a:ext uri="{FF2B5EF4-FFF2-40B4-BE49-F238E27FC236}">
-                  <a16:creationId xmlns:a16="http://schemas.microsoft.com/office/drawing/2014/main" id="{A4A14BCD-5FFC-D143-8057-C930DF26F33F}"/>
+                  <a16:creationId xmlns:a16="http://schemas.microsoft.com/office/drawing/2014/main" xmlns="" id="{A4A14BCD-5FFC-D143-8057-C930DF26F33F}"/>
                 </a:ext>
               </a:extLst>
             </p:cNvPr>
@@ -4423,7 +4220,7 @@
             <p:cNvPr id="64" name="Straight Arrow Connector 63">
               <a:extLst>
                 <a:ext uri="{FF2B5EF4-FFF2-40B4-BE49-F238E27FC236}">
-                  <a16:creationId xmlns:a16="http://schemas.microsoft.com/office/drawing/2014/main" id="{397D59C9-A4CA-D240-9B2D-D0655B4EE6A8}"/>
+                  <a16:creationId xmlns:a16="http://schemas.microsoft.com/office/drawing/2014/main" xmlns="" id="{397D59C9-A4CA-D240-9B2D-D0655B4EE6A8}"/>
                 </a:ext>
               </a:extLst>
             </p:cNvPr>
@@ -4465,7 +4262,7 @@
             <p:cNvPr id="65" name="Straight Arrow Connector 64">
               <a:extLst>
                 <a:ext uri="{FF2B5EF4-FFF2-40B4-BE49-F238E27FC236}">
-                  <a16:creationId xmlns:a16="http://schemas.microsoft.com/office/drawing/2014/main" id="{51B0F3CE-5540-0F48-8426-52A66E8011BE}"/>
+                  <a16:creationId xmlns:a16="http://schemas.microsoft.com/office/drawing/2014/main" xmlns="" id="{51B0F3CE-5540-0F48-8426-52A66E8011BE}"/>
                 </a:ext>
               </a:extLst>
             </p:cNvPr>
@@ -4509,7 +4306,7 @@
             <p:cNvPr id="67" name="Straight Arrow Connector 66">
               <a:extLst>
                 <a:ext uri="{FF2B5EF4-FFF2-40B4-BE49-F238E27FC236}">
-                  <a16:creationId xmlns:a16="http://schemas.microsoft.com/office/drawing/2014/main" id="{1C565EAE-89D8-0842-8AA0-B3F0D8FD7A56}"/>
+                  <a16:creationId xmlns:a16="http://schemas.microsoft.com/office/drawing/2014/main" xmlns="" id="{1C565EAE-89D8-0842-8AA0-B3F0D8FD7A56}"/>
                 </a:ext>
               </a:extLst>
             </p:cNvPr>
@@ -4551,7 +4348,7 @@
             <p:cNvPr id="68" name="Straight Arrow Connector 67">
               <a:extLst>
                 <a:ext uri="{FF2B5EF4-FFF2-40B4-BE49-F238E27FC236}">
-                  <a16:creationId xmlns:a16="http://schemas.microsoft.com/office/drawing/2014/main" id="{DC18251D-0A25-FF4C-98BD-0A447A4C67B9}"/>
+                  <a16:creationId xmlns:a16="http://schemas.microsoft.com/office/drawing/2014/main" xmlns="" id="{DC18251D-0A25-FF4C-98BD-0A447A4C67B9}"/>
                 </a:ext>
               </a:extLst>
             </p:cNvPr>
@@ -4593,7 +4390,7 @@
             <p:cNvPr id="69" name="Straight Arrow Connector 68">
               <a:extLst>
                 <a:ext uri="{FF2B5EF4-FFF2-40B4-BE49-F238E27FC236}">
-                  <a16:creationId xmlns:a16="http://schemas.microsoft.com/office/drawing/2014/main" id="{3A2D9C50-A199-BA4C-97E0-A55DE08A45B9}"/>
+                  <a16:creationId xmlns:a16="http://schemas.microsoft.com/office/drawing/2014/main" xmlns="" id="{3A2D9C50-A199-BA4C-97E0-A55DE08A45B9}"/>
                 </a:ext>
               </a:extLst>
             </p:cNvPr>
@@ -4636,20 +4433,19 @@
           <p:cNvPr id="48" name="Straight Arrow Connector 47">
             <a:extLst>
               <a:ext uri="{FF2B5EF4-FFF2-40B4-BE49-F238E27FC236}">
-                <a16:creationId xmlns:a16="http://schemas.microsoft.com/office/drawing/2014/main" id="{5FCCD42C-EFB4-1D49-B5F7-3085455FDC19}"/>
+                <a16:creationId xmlns:a16="http://schemas.microsoft.com/office/drawing/2014/main" xmlns="" id="{5FCCD42C-EFB4-1D49-B5F7-3085455FDC19}"/>
               </a:ext>
             </a:extLst>
           </p:cNvPr>
           <p:cNvCxnSpPr>
             <a:cxnSpLocks/>
-            <a:endCxn id="8" idx="0"/>
           </p:cNvCxnSpPr>
           <p:nvPr/>
         </p:nvCxnSpPr>
         <p:spPr>
           <a:xfrm flipH="1">
-            <a:off x="6289689" y="1182669"/>
-            <a:ext cx="11528" cy="353633"/>
+            <a:off x="5969847" y="1261069"/>
+            <a:ext cx="17790" cy="728535"/>
           </a:xfrm>
           <a:prstGeom prst="straightConnector1">
             <a:avLst/>
@@ -4681,50 +4477,7 @@
           <p:cNvPr id="51" name="Straight Connector 50">
             <a:extLst>
               <a:ext uri="{FF2B5EF4-FFF2-40B4-BE49-F238E27FC236}">
-                <a16:creationId xmlns:a16="http://schemas.microsoft.com/office/drawing/2014/main" id="{4E1C3BC7-78D5-E642-8E48-BCAD992A4446}"/>
-              </a:ext>
-            </a:extLst>
-          </p:cNvPr>
-          <p:cNvCxnSpPr>
-            <a:cxnSpLocks/>
-          </p:cNvCxnSpPr>
-          <p:nvPr/>
-        </p:nvCxnSpPr>
-        <p:spPr>
-          <a:xfrm flipV="1">
-            <a:off x="2452013" y="1948245"/>
-            <a:ext cx="2786072" cy="9997"/>
-          </a:xfrm>
-          <a:prstGeom prst="line">
-            <a:avLst/>
-          </a:prstGeom>
-          <a:ln>
-            <a:solidFill>
-              <a:schemeClr val="tx1"/>
-            </a:solidFill>
-          </a:ln>
-        </p:spPr>
-        <p:style>
-          <a:lnRef idx="1">
-            <a:schemeClr val="accent1"/>
-          </a:lnRef>
-          <a:fillRef idx="0">
-            <a:schemeClr val="accent1"/>
-          </a:fillRef>
-          <a:effectRef idx="0">
-            <a:schemeClr val="accent1"/>
-          </a:effectRef>
-          <a:fontRef idx="minor">
-            <a:schemeClr val="tx1"/>
-          </a:fontRef>
-        </p:style>
-      </p:cxnSp>
-      <p:cxnSp>
-        <p:nvCxnSpPr>
-          <p:cNvPr id="54" name="Straight Connector 53">
-            <a:extLst>
-              <a:ext uri="{FF2B5EF4-FFF2-40B4-BE49-F238E27FC236}">
-                <a16:creationId xmlns:a16="http://schemas.microsoft.com/office/drawing/2014/main" id="{78D48287-6C1F-B248-AD92-D64AE91EF94D}"/>
+                <a16:creationId xmlns:a16="http://schemas.microsoft.com/office/drawing/2014/main" xmlns="" id="{4E1C3BC7-78D5-E642-8E48-BCAD992A4446}"/>
               </a:ext>
             </a:extLst>
           </p:cNvPr>
@@ -4735,8 +4488,8 @@
         </p:nvCxnSpPr>
         <p:spPr>
           <a:xfrm>
-            <a:off x="7316241" y="1951310"/>
-            <a:ext cx="2411109" cy="0"/>
+            <a:off x="3939073" y="1932674"/>
+            <a:ext cx="4945069" cy="1"/>
           </a:xfrm>
           <a:prstGeom prst="line">
             <a:avLst/>
@@ -4767,7 +4520,7 @@
           <p:cNvPr id="66" name="Straight Arrow Connector 65">
             <a:extLst>
               <a:ext uri="{FF2B5EF4-FFF2-40B4-BE49-F238E27FC236}">
-                <a16:creationId xmlns:a16="http://schemas.microsoft.com/office/drawing/2014/main" id="{FB3FE856-7C36-104B-8124-177FB6A68009}"/>
+                <a16:creationId xmlns:a16="http://schemas.microsoft.com/office/drawing/2014/main" xmlns="" id="{FB3FE856-7C36-104B-8124-177FB6A68009}"/>
               </a:ext>
             </a:extLst>
           </p:cNvPr>
@@ -4811,7 +4564,7 @@
           <p:cNvPr id="71" name="Rectangle 70">
             <a:extLst>
               <a:ext uri="{FF2B5EF4-FFF2-40B4-BE49-F238E27FC236}">
-                <a16:creationId xmlns:a16="http://schemas.microsoft.com/office/drawing/2014/main" id="{0A5291A7-2701-414C-85F0-8A15330843B1}"/>
+                <a16:creationId xmlns:a16="http://schemas.microsoft.com/office/drawing/2014/main" xmlns="" id="{0A5291A7-2701-414C-85F0-8A15330843B1}"/>
               </a:ext>
             </a:extLst>
           </p:cNvPr>
@@ -4863,7 +4616,7 @@
           <p:cNvPr id="73" name="TextBox 72">
             <a:extLst>
               <a:ext uri="{FF2B5EF4-FFF2-40B4-BE49-F238E27FC236}">
-                <a16:creationId xmlns:a16="http://schemas.microsoft.com/office/drawing/2014/main" id="{A6196927-D4FD-CB4A-B151-7C47110FF202}"/>
+                <a16:creationId xmlns:a16="http://schemas.microsoft.com/office/drawing/2014/main" xmlns="" id="{A6196927-D4FD-CB4A-B151-7C47110FF202}"/>
               </a:ext>
             </a:extLst>
           </p:cNvPr>
@@ -4898,7 +4651,7 @@
           <p:cNvPr id="75" name="Straight Arrow Connector 74">
             <a:extLst>
               <a:ext uri="{FF2B5EF4-FFF2-40B4-BE49-F238E27FC236}">
-                <a16:creationId xmlns:a16="http://schemas.microsoft.com/office/drawing/2014/main" id="{254ADC63-8312-1E44-BF5D-1B670E625E69}"/>
+                <a16:creationId xmlns:a16="http://schemas.microsoft.com/office/drawing/2014/main" xmlns="" id="{254ADC63-8312-1E44-BF5D-1B670E625E69}"/>
               </a:ext>
             </a:extLst>
           </p:cNvPr>
@@ -4909,7 +4662,7 @@
         </p:nvCxnSpPr>
         <p:spPr>
           <a:xfrm flipH="1">
-            <a:off x="1811276" y="4961319"/>
+            <a:off x="1811276" y="4976999"/>
             <a:ext cx="1" cy="443634"/>
           </a:xfrm>
           <a:prstGeom prst="straightConnector1">
@@ -4942,7 +4695,7 @@
           <p:cNvPr id="76" name="Straight Connector 75">
             <a:extLst>
               <a:ext uri="{FF2B5EF4-FFF2-40B4-BE49-F238E27FC236}">
-                <a16:creationId xmlns:a16="http://schemas.microsoft.com/office/drawing/2014/main" id="{661DC090-4C02-3B4A-B8CD-6A7F90B03F92}"/>
+                <a16:creationId xmlns:a16="http://schemas.microsoft.com/office/drawing/2014/main" xmlns="" id="{661DC090-4C02-3B4A-B8CD-6A7F90B03F92}"/>
               </a:ext>
             </a:extLst>
           </p:cNvPr>
@@ -4953,8 +4706,8 @@
         </p:nvCxnSpPr>
         <p:spPr>
           <a:xfrm flipV="1">
-            <a:off x="2143428" y="5091628"/>
-            <a:ext cx="7328609" cy="21163"/>
+            <a:off x="2143428" y="5185708"/>
+            <a:ext cx="6737282" cy="21164"/>
           </a:xfrm>
           <a:prstGeom prst="line">
             <a:avLst/>
@@ -4985,7 +4738,7 @@
           <p:cNvPr id="77" name="Straight Arrow Connector 76">
             <a:extLst>
               <a:ext uri="{FF2B5EF4-FFF2-40B4-BE49-F238E27FC236}">
-                <a16:creationId xmlns:a16="http://schemas.microsoft.com/office/drawing/2014/main" id="{3311235A-A13C-5E4E-9DC1-AE83BA8CB732}"/>
+                <a16:creationId xmlns:a16="http://schemas.microsoft.com/office/drawing/2014/main" xmlns="" id="{3311235A-A13C-5E4E-9DC1-AE83BA8CB732}"/>
               </a:ext>
             </a:extLst>
           </p:cNvPr>
@@ -4995,9 +4748,9 @@
           <p:nvPr/>
         </p:nvCxnSpPr>
         <p:spPr>
-          <a:xfrm flipH="1">
-            <a:off x="2143429" y="5101515"/>
-            <a:ext cx="10390" cy="364283"/>
+          <a:xfrm>
+            <a:off x="2143428" y="5185708"/>
+            <a:ext cx="1" cy="280090"/>
           </a:xfrm>
           <a:prstGeom prst="straightConnector1">
             <a:avLst/>
@@ -5029,7 +4782,7 @@
           <p:cNvPr id="78" name="Straight Connector 77">
             <a:extLst>
               <a:ext uri="{FF2B5EF4-FFF2-40B4-BE49-F238E27FC236}">
-                <a16:creationId xmlns:a16="http://schemas.microsoft.com/office/drawing/2014/main" id="{39E68E14-3471-8F47-95B5-76D0E2FC52EA}"/>
+                <a16:creationId xmlns:a16="http://schemas.microsoft.com/office/drawing/2014/main" xmlns="" id="{39E68E14-3471-8F47-95B5-76D0E2FC52EA}"/>
               </a:ext>
             </a:extLst>
           </p:cNvPr>
@@ -5040,8 +4793,8 @@
         </p:nvCxnSpPr>
         <p:spPr>
           <a:xfrm>
-            <a:off x="9476485" y="4883754"/>
-            <a:ext cx="0" cy="205235"/>
+            <a:off x="8880710" y="3685117"/>
+            <a:ext cx="3432" cy="1521754"/>
           </a:xfrm>
           <a:prstGeom prst="line">
             <a:avLst/>
@@ -5050,6 +4803,339 @@
             <a:solidFill>
               <a:schemeClr val="tx1"/>
             </a:solidFill>
+          </a:ln>
+        </p:spPr>
+        <p:style>
+          <a:lnRef idx="1">
+            <a:schemeClr val="accent1"/>
+          </a:lnRef>
+          <a:fillRef idx="0">
+            <a:schemeClr val="accent1"/>
+          </a:fillRef>
+          <a:effectRef idx="0">
+            <a:schemeClr val="accent1"/>
+          </a:effectRef>
+          <a:fontRef idx="minor">
+            <a:schemeClr val="tx1"/>
+          </a:fontRef>
+        </p:style>
+      </p:cxnSp>
+      <p:sp>
+        <p:nvSpPr>
+          <p:cNvPr id="5" name="Oval 4"/>
+          <p:cNvSpPr/>
+          <p:nvPr/>
+        </p:nvSpPr>
+        <p:spPr>
+          <a:xfrm>
+            <a:off x="5012007" y="409075"/>
+            <a:ext cx="1996274" cy="845317"/>
+          </a:xfrm>
+          <a:prstGeom prst="ellipse">
+            <a:avLst/>
+          </a:prstGeom>
+          <a:noFill/>
+        </p:spPr>
+        <p:style>
+          <a:lnRef idx="1">
+            <a:schemeClr val="accent1"/>
+          </a:lnRef>
+          <a:fillRef idx="3">
+            <a:schemeClr val="accent1"/>
+          </a:fillRef>
+          <a:effectRef idx="2">
+            <a:schemeClr val="accent1"/>
+          </a:effectRef>
+          <a:fontRef idx="minor">
+            <a:schemeClr val="lt1"/>
+          </a:fontRef>
+        </p:style>
+        <p:txBody>
+          <a:bodyPr rtlCol="0" anchor="ctr"/>
+          <a:lstStyle/>
+          <a:p>
+            <a:pPr algn="ctr"/>
+            <a:endParaRPr lang="en-US"/>
+          </a:p>
+        </p:txBody>
+      </p:sp>
+      <p:cxnSp>
+        <p:nvCxnSpPr>
+          <p:cNvPr id="62" name="Straight Connector 61">
+            <a:extLst>
+              <a:ext uri="{FF2B5EF4-FFF2-40B4-BE49-F238E27FC236}">
+                <a16:creationId xmlns:a16="http://schemas.microsoft.com/office/drawing/2014/main" xmlns="" id="{661DC090-4C02-3B4A-B8CD-6A7F90B03F92}"/>
+              </a:ext>
+            </a:extLst>
+          </p:cNvPr>
+          <p:cNvCxnSpPr>
+            <a:cxnSpLocks/>
+          </p:cNvCxnSpPr>
+          <p:nvPr/>
+        </p:nvCxnSpPr>
+        <p:spPr>
+          <a:xfrm>
+            <a:off x="9485456" y="3339162"/>
+            <a:ext cx="262094" cy="0"/>
+          </a:xfrm>
+          <a:prstGeom prst="line">
+            <a:avLst/>
+          </a:prstGeom>
+          <a:ln>
+            <a:solidFill>
+              <a:schemeClr val="tx1"/>
+            </a:solidFill>
+          </a:ln>
+        </p:spPr>
+        <p:style>
+          <a:lnRef idx="1">
+            <a:schemeClr val="accent1"/>
+          </a:lnRef>
+          <a:fillRef idx="0">
+            <a:schemeClr val="accent1"/>
+          </a:fillRef>
+          <a:effectRef idx="0">
+            <a:schemeClr val="accent1"/>
+          </a:effectRef>
+          <a:fontRef idx="minor">
+            <a:schemeClr val="tx1"/>
+          </a:fontRef>
+        </p:style>
+      </p:cxnSp>
+      <p:cxnSp>
+        <p:nvCxnSpPr>
+          <p:cNvPr id="70" name="Straight Arrow Connector 69">
+            <a:extLst>
+              <a:ext uri="{FF2B5EF4-FFF2-40B4-BE49-F238E27FC236}">
+                <a16:creationId xmlns:a16="http://schemas.microsoft.com/office/drawing/2014/main" xmlns="" id="{3B61AD32-469A-F448-B104-2A1720F9AAFE}"/>
+              </a:ext>
+            </a:extLst>
+          </p:cNvPr>
+          <p:cNvCxnSpPr>
+            <a:cxnSpLocks/>
+          </p:cNvCxnSpPr>
+          <p:nvPr/>
+        </p:nvCxnSpPr>
+        <p:spPr>
+          <a:xfrm flipH="1">
+            <a:off x="4879937" y="3720746"/>
+            <a:ext cx="1" cy="573353"/>
+          </a:xfrm>
+          <a:prstGeom prst="straightConnector1">
+            <a:avLst/>
+          </a:prstGeom>
+          <a:ln>
+            <a:solidFill>
+              <a:schemeClr val="tx1"/>
+            </a:solidFill>
+            <a:tailEnd type="triangle"/>
+          </a:ln>
+        </p:spPr>
+        <p:style>
+          <a:lnRef idx="1">
+            <a:schemeClr val="accent1"/>
+          </a:lnRef>
+          <a:fillRef idx="0">
+            <a:schemeClr val="accent1"/>
+          </a:fillRef>
+          <a:effectRef idx="0">
+            <a:schemeClr val="accent1"/>
+          </a:effectRef>
+          <a:fontRef idx="minor">
+            <a:schemeClr val="tx1"/>
+          </a:fontRef>
+        </p:style>
+      </p:cxnSp>
+      <p:cxnSp>
+        <p:nvCxnSpPr>
+          <p:cNvPr id="72" name="Straight Arrow Connector 71">
+            <a:extLst>
+              <a:ext uri="{FF2B5EF4-FFF2-40B4-BE49-F238E27FC236}">
+                <a16:creationId xmlns:a16="http://schemas.microsoft.com/office/drawing/2014/main" xmlns="" id="{3B61AD32-469A-F448-B104-2A1720F9AAFE}"/>
+              </a:ext>
+            </a:extLst>
+          </p:cNvPr>
+          <p:cNvCxnSpPr>
+            <a:cxnSpLocks/>
+          </p:cNvCxnSpPr>
+          <p:nvPr/>
+        </p:nvCxnSpPr>
+        <p:spPr>
+          <a:xfrm flipH="1">
+            <a:off x="6048222" y="3685117"/>
+            <a:ext cx="1" cy="573353"/>
+          </a:xfrm>
+          <a:prstGeom prst="straightConnector1">
+            <a:avLst/>
+          </a:prstGeom>
+          <a:ln>
+            <a:solidFill>
+              <a:schemeClr val="tx1"/>
+            </a:solidFill>
+            <a:tailEnd type="triangle"/>
+          </a:ln>
+        </p:spPr>
+        <p:style>
+          <a:lnRef idx="1">
+            <a:schemeClr val="accent1"/>
+          </a:lnRef>
+          <a:fillRef idx="0">
+            <a:schemeClr val="accent1"/>
+          </a:fillRef>
+          <a:effectRef idx="0">
+            <a:schemeClr val="accent1"/>
+          </a:effectRef>
+          <a:fontRef idx="minor">
+            <a:schemeClr val="tx1"/>
+          </a:fontRef>
+        </p:style>
+      </p:cxnSp>
+      <p:cxnSp>
+        <p:nvCxnSpPr>
+          <p:cNvPr id="79" name="Straight Connector 78">
+            <a:extLst>
+              <a:ext uri="{FF2B5EF4-FFF2-40B4-BE49-F238E27FC236}">
+                <a16:creationId xmlns:a16="http://schemas.microsoft.com/office/drawing/2014/main" xmlns="" id="{661DC090-4C02-3B4A-B8CD-6A7F90B03F92}"/>
+              </a:ext>
+            </a:extLst>
+          </p:cNvPr>
+          <p:cNvCxnSpPr>
+            <a:cxnSpLocks/>
+          </p:cNvCxnSpPr>
+          <p:nvPr/>
+        </p:nvCxnSpPr>
+        <p:spPr>
+          <a:xfrm>
+            <a:off x="1811276" y="4971901"/>
+            <a:ext cx="2899446" cy="0"/>
+          </a:xfrm>
+          <a:prstGeom prst="line">
+            <a:avLst/>
+          </a:prstGeom>
+          <a:ln>
+            <a:solidFill>
+              <a:schemeClr val="tx1"/>
+            </a:solidFill>
+          </a:ln>
+        </p:spPr>
+        <p:style>
+          <a:lnRef idx="1">
+            <a:schemeClr val="accent1"/>
+          </a:lnRef>
+          <a:fillRef idx="0">
+            <a:schemeClr val="accent1"/>
+          </a:fillRef>
+          <a:effectRef idx="0">
+            <a:schemeClr val="accent1"/>
+          </a:effectRef>
+          <a:fontRef idx="minor">
+            <a:schemeClr val="tx1"/>
+          </a:fontRef>
+        </p:style>
+      </p:cxnSp>
+      <p:sp>
+        <p:nvSpPr>
+          <p:cNvPr id="80" name="Oval 79"/>
+          <p:cNvSpPr/>
+          <p:nvPr/>
+        </p:nvSpPr>
+        <p:spPr>
+          <a:xfrm>
+            <a:off x="9037218" y="629274"/>
+            <a:ext cx="569571" cy="187706"/>
+          </a:xfrm>
+          <a:prstGeom prst="ellipse">
+            <a:avLst/>
+          </a:prstGeom>
+          <a:noFill/>
+        </p:spPr>
+        <p:style>
+          <a:lnRef idx="1">
+            <a:schemeClr val="accent1"/>
+          </a:lnRef>
+          <a:fillRef idx="3">
+            <a:schemeClr val="accent1"/>
+          </a:fillRef>
+          <a:effectRef idx="2">
+            <a:schemeClr val="accent1"/>
+          </a:effectRef>
+          <a:fontRef idx="minor">
+            <a:schemeClr val="lt1"/>
+          </a:fontRef>
+        </p:style>
+        <p:txBody>
+          <a:bodyPr rtlCol="0" anchor="ctr"/>
+          <a:lstStyle/>
+          <a:p>
+            <a:pPr algn="ctr"/>
+            <a:endParaRPr lang="en-US"/>
+          </a:p>
+        </p:txBody>
+      </p:sp>
+      <p:sp>
+        <p:nvSpPr>
+          <p:cNvPr id="81" name="TextBox 80">
+            <a:extLst>
+              <a:ext uri="{FF2B5EF4-FFF2-40B4-BE49-F238E27FC236}">
+                <a16:creationId xmlns:a16="http://schemas.microsoft.com/office/drawing/2014/main" xmlns="" id="{F146DE89-AFB1-2B44-9426-34C7A81212D6}"/>
+              </a:ext>
+            </a:extLst>
+          </p:cNvPr>
+          <p:cNvSpPr txBox="1"/>
+          <p:nvPr/>
+        </p:nvSpPr>
+        <p:spPr>
+          <a:xfrm>
+            <a:off x="10192466" y="503154"/>
+            <a:ext cx="1608133" cy="369332"/>
+          </a:xfrm>
+          <a:prstGeom prst="rect">
+            <a:avLst/>
+          </a:prstGeom>
+          <a:noFill/>
+        </p:spPr>
+        <p:txBody>
+          <a:bodyPr wrap="none" rtlCol="0">
+            <a:spAutoFit/>
+          </a:bodyPr>
+          <a:lstStyle/>
+          <a:p>
+            <a:pPr algn="ctr"/>
+            <a:r>
+              <a:rPr lang="en-US" dirty="0" smtClean="0"/>
+              <a:t>Not part of CFS</a:t>
+            </a:r>
+            <a:endParaRPr lang="en-US" dirty="0"/>
+          </a:p>
+        </p:txBody>
+      </p:sp>
+      <p:cxnSp>
+        <p:nvCxnSpPr>
+          <p:cNvPr id="82" name="Straight Arrow Connector 81">
+            <a:extLst>
+              <a:ext uri="{FF2B5EF4-FFF2-40B4-BE49-F238E27FC236}">
+                <a16:creationId xmlns:a16="http://schemas.microsoft.com/office/drawing/2014/main" xmlns="" id="{254ADC63-8312-1E44-BF5D-1B670E625E69}"/>
+              </a:ext>
+            </a:extLst>
+          </p:cNvPr>
+          <p:cNvCxnSpPr>
+            <a:cxnSpLocks/>
+          </p:cNvCxnSpPr>
+          <p:nvPr/>
+        </p:nvCxnSpPr>
+        <p:spPr>
+          <a:xfrm>
+            <a:off x="9711672" y="734860"/>
+            <a:ext cx="480794" cy="0"/>
+          </a:xfrm>
+          <a:prstGeom prst="straightConnector1">
+            <a:avLst/>
+          </a:prstGeom>
+          <a:ln>
+            <a:solidFill>
+              <a:schemeClr val="tx1"/>
+            </a:solidFill>
+            <a:tailEnd type="triangle"/>
           </a:ln>
         </p:spPr>
         <p:style>
@@ -5123,7 +5209,7 @@
     </a:clrScheme>
     <a:fontScheme name="Office">
       <a:majorFont>
-        <a:latin typeface="Calibri Light" panose="020F0302020204030204"/>
+        <a:latin typeface="Calibri Light"/>
         <a:ea typeface=""/>
         <a:cs typeface=""/>
         <a:font script="Jpan" typeface="游ゴシック Light"/>
@@ -5175,7 +5261,7 @@
         <a:font script="Tfng" typeface="Ebrima"/>
       </a:majorFont>
       <a:minorFont>
-        <a:latin typeface="Calibri" panose="020F0502020204030204"/>
+        <a:latin typeface="Calibri"/>
         <a:ea typeface=""/>
         <a:cs typeface=""/>
         <a:font script="Jpan" typeface="游ゴシック"/>
@@ -5369,7 +5455,7 @@
   <a:extraClrSchemeLst/>
   <a:extLst>
     <a:ext uri="{05A4C25C-085E-4340-85A3-A5531E510DB2}">
-      <thm15:themeFamily xmlns:thm15="http://schemas.microsoft.com/office/thememl/2012/main" name="Office Theme" id="{62F939B6-93AF-4DB8-9C6B-D6C7DFDC589F}" vid="{4A3C46E8-61CC-4603-A589-7422A47A8E4A}"/>
+      <thm15:themeFamily xmlns:thm15="http://schemas.microsoft.com/office/thememl/2012/main" xmlns="" name="Office Theme" id="{62F939B6-93AF-4DB8-9C6B-D6C7DFDC589F}" vid="{4A3C46E8-61CC-4603-A589-7422A47A8E4A}"/>
     </a:ext>
   </a:extLst>
 </a:theme>

</xml_diff>